<commit_message>
Updating structure of project: adding client-proxy protocols
</commit_message>
<xml_diff>
--- a/Structure of project.pptx
+++ b/Structure of project.pptx
@@ -6,8 +6,9 @@
   </p:sldMasterIdLst>
   <p:sldIdLst>
     <p:sldId id="257" r:id="rId2"/>
-    <p:sldId id="259" r:id="rId3"/>
-    <p:sldId id="258" r:id="rId4"/>
+    <p:sldId id="260" r:id="rId3"/>
+    <p:sldId id="259" r:id="rId4"/>
+    <p:sldId id="258" r:id="rId5"/>
   </p:sldIdLst>
   <p:sldSz cx="9144000" cy="6858000" type="screen4x3"/>
   <p:notesSz cx="6858000" cy="9144000"/>
@@ -291,9 +292,9 @@
             <a:fld id="{5B106E36-FD25-4E2D-B0AA-010F637433A0}" type="datetimeFigureOut">
               <a:rPr lang="ru-RU" smtClean="0"/>
               <a:pPr/>
-              <a:t>30.05.2020</a:t>
+              <a:t>14.06.2020</a:t>
             </a:fld>
-            <a:endParaRPr lang="ru-RU"/>
+            <a:endParaRPr lang="ru-RU" dirty="0"/>
           </a:p>
         </p:txBody>
       </p:sp>
@@ -312,7 +313,7 @@
           <a:bodyPr/>
           <a:lstStyle/>
           <a:p>
-            <a:endParaRPr lang="ru-RU"/>
+            <a:endParaRPr lang="ru-RU" dirty="0"/>
           </a:p>
         </p:txBody>
       </p:sp>
@@ -336,7 +337,7 @@
               <a:pPr/>
               <a:t>‹#›</a:t>
             </a:fld>
-            <a:endParaRPr lang="ru-RU"/>
+            <a:endParaRPr lang="ru-RU" dirty="0"/>
           </a:p>
         </p:txBody>
       </p:sp>
@@ -458,9 +459,9 @@
             <a:fld id="{5B106E36-FD25-4E2D-B0AA-010F637433A0}" type="datetimeFigureOut">
               <a:rPr lang="ru-RU" smtClean="0"/>
               <a:pPr/>
-              <a:t>30.05.2020</a:t>
+              <a:t>14.06.2020</a:t>
             </a:fld>
-            <a:endParaRPr lang="ru-RU"/>
+            <a:endParaRPr lang="ru-RU" dirty="0"/>
           </a:p>
         </p:txBody>
       </p:sp>
@@ -479,7 +480,7 @@
           <a:bodyPr/>
           <a:lstStyle/>
           <a:p>
-            <a:endParaRPr lang="ru-RU"/>
+            <a:endParaRPr lang="ru-RU" dirty="0"/>
           </a:p>
         </p:txBody>
       </p:sp>
@@ -503,7 +504,7 @@
               <a:pPr/>
               <a:t>‹#›</a:t>
             </a:fld>
-            <a:endParaRPr lang="ru-RU"/>
+            <a:endParaRPr lang="ru-RU" dirty="0"/>
           </a:p>
         </p:txBody>
       </p:sp>
@@ -635,9 +636,9 @@
             <a:fld id="{5B106E36-FD25-4E2D-B0AA-010F637433A0}" type="datetimeFigureOut">
               <a:rPr lang="ru-RU" smtClean="0"/>
               <a:pPr/>
-              <a:t>30.05.2020</a:t>
+              <a:t>14.06.2020</a:t>
             </a:fld>
-            <a:endParaRPr lang="ru-RU"/>
+            <a:endParaRPr lang="ru-RU" dirty="0"/>
           </a:p>
         </p:txBody>
       </p:sp>
@@ -656,7 +657,7 @@
           <a:bodyPr/>
           <a:lstStyle/>
           <a:p>
-            <a:endParaRPr lang="ru-RU"/>
+            <a:endParaRPr lang="ru-RU" dirty="0"/>
           </a:p>
         </p:txBody>
       </p:sp>
@@ -680,7 +681,7 @@
               <a:pPr/>
               <a:t>‹#›</a:t>
             </a:fld>
-            <a:endParaRPr lang="ru-RU"/>
+            <a:endParaRPr lang="ru-RU" dirty="0"/>
           </a:p>
         </p:txBody>
       </p:sp>
@@ -802,9 +803,9 @@
             <a:fld id="{5B106E36-FD25-4E2D-B0AA-010F637433A0}" type="datetimeFigureOut">
               <a:rPr lang="ru-RU" smtClean="0"/>
               <a:pPr/>
-              <a:t>30.05.2020</a:t>
+              <a:t>14.06.2020</a:t>
             </a:fld>
-            <a:endParaRPr lang="ru-RU"/>
+            <a:endParaRPr lang="ru-RU" dirty="0"/>
           </a:p>
         </p:txBody>
       </p:sp>
@@ -823,7 +824,7 @@
           <a:bodyPr/>
           <a:lstStyle/>
           <a:p>
-            <a:endParaRPr lang="ru-RU"/>
+            <a:endParaRPr lang="ru-RU" dirty="0"/>
           </a:p>
         </p:txBody>
       </p:sp>
@@ -847,7 +848,7 @@
               <a:pPr/>
               <a:t>‹#›</a:t>
             </a:fld>
-            <a:endParaRPr lang="ru-RU"/>
+            <a:endParaRPr lang="ru-RU" dirty="0"/>
           </a:p>
         </p:txBody>
       </p:sp>
@@ -1045,9 +1046,9 @@
             <a:fld id="{5B106E36-FD25-4E2D-B0AA-010F637433A0}" type="datetimeFigureOut">
               <a:rPr lang="ru-RU" smtClean="0"/>
               <a:pPr/>
-              <a:t>30.05.2020</a:t>
+              <a:t>14.06.2020</a:t>
             </a:fld>
-            <a:endParaRPr lang="ru-RU"/>
+            <a:endParaRPr lang="ru-RU" dirty="0"/>
           </a:p>
         </p:txBody>
       </p:sp>
@@ -1066,7 +1067,7 @@
           <a:bodyPr/>
           <a:lstStyle/>
           <a:p>
-            <a:endParaRPr lang="ru-RU"/>
+            <a:endParaRPr lang="ru-RU" dirty="0"/>
           </a:p>
         </p:txBody>
       </p:sp>
@@ -1090,7 +1091,7 @@
               <a:pPr/>
               <a:t>‹#›</a:t>
             </a:fld>
-            <a:endParaRPr lang="ru-RU"/>
+            <a:endParaRPr lang="ru-RU" dirty="0"/>
           </a:p>
         </p:txBody>
       </p:sp>
@@ -1330,9 +1331,9 @@
             <a:fld id="{5B106E36-FD25-4E2D-B0AA-010F637433A0}" type="datetimeFigureOut">
               <a:rPr lang="ru-RU" smtClean="0"/>
               <a:pPr/>
-              <a:t>30.05.2020</a:t>
+              <a:t>14.06.2020</a:t>
             </a:fld>
-            <a:endParaRPr lang="ru-RU"/>
+            <a:endParaRPr lang="ru-RU" dirty="0"/>
           </a:p>
         </p:txBody>
       </p:sp>
@@ -1351,7 +1352,7 @@
           <a:bodyPr/>
           <a:lstStyle/>
           <a:p>
-            <a:endParaRPr lang="ru-RU"/>
+            <a:endParaRPr lang="ru-RU" dirty="0"/>
           </a:p>
         </p:txBody>
       </p:sp>
@@ -1375,7 +1376,7 @@
               <a:pPr/>
               <a:t>‹#›</a:t>
             </a:fld>
-            <a:endParaRPr lang="ru-RU"/>
+            <a:endParaRPr lang="ru-RU" dirty="0"/>
           </a:p>
         </p:txBody>
       </p:sp>
@@ -1749,9 +1750,9 @@
             <a:fld id="{5B106E36-FD25-4E2D-B0AA-010F637433A0}" type="datetimeFigureOut">
               <a:rPr lang="ru-RU" smtClean="0"/>
               <a:pPr/>
-              <a:t>30.05.2020</a:t>
+              <a:t>14.06.2020</a:t>
             </a:fld>
-            <a:endParaRPr lang="ru-RU"/>
+            <a:endParaRPr lang="ru-RU" dirty="0"/>
           </a:p>
         </p:txBody>
       </p:sp>
@@ -1770,7 +1771,7 @@
           <a:bodyPr/>
           <a:lstStyle/>
           <a:p>
-            <a:endParaRPr lang="ru-RU"/>
+            <a:endParaRPr lang="ru-RU" dirty="0"/>
           </a:p>
         </p:txBody>
       </p:sp>
@@ -1794,7 +1795,7 @@
               <a:pPr/>
               <a:t>‹#›</a:t>
             </a:fld>
-            <a:endParaRPr lang="ru-RU"/>
+            <a:endParaRPr lang="ru-RU" dirty="0"/>
           </a:p>
         </p:txBody>
       </p:sp>
@@ -1864,9 +1865,9 @@
             <a:fld id="{5B106E36-FD25-4E2D-B0AA-010F637433A0}" type="datetimeFigureOut">
               <a:rPr lang="ru-RU" smtClean="0"/>
               <a:pPr/>
-              <a:t>30.05.2020</a:t>
+              <a:t>14.06.2020</a:t>
             </a:fld>
-            <a:endParaRPr lang="ru-RU"/>
+            <a:endParaRPr lang="ru-RU" dirty="0"/>
           </a:p>
         </p:txBody>
       </p:sp>
@@ -1885,7 +1886,7 @@
           <a:bodyPr/>
           <a:lstStyle/>
           <a:p>
-            <a:endParaRPr lang="ru-RU"/>
+            <a:endParaRPr lang="ru-RU" dirty="0"/>
           </a:p>
         </p:txBody>
       </p:sp>
@@ -1909,7 +1910,7 @@
               <a:pPr/>
               <a:t>‹#›</a:t>
             </a:fld>
-            <a:endParaRPr lang="ru-RU"/>
+            <a:endParaRPr lang="ru-RU" dirty="0"/>
           </a:p>
         </p:txBody>
       </p:sp>
@@ -1956,9 +1957,9 @@
             <a:fld id="{5B106E36-FD25-4E2D-B0AA-010F637433A0}" type="datetimeFigureOut">
               <a:rPr lang="ru-RU" smtClean="0"/>
               <a:pPr/>
-              <a:t>30.05.2020</a:t>
+              <a:t>14.06.2020</a:t>
             </a:fld>
-            <a:endParaRPr lang="ru-RU"/>
+            <a:endParaRPr lang="ru-RU" dirty="0"/>
           </a:p>
         </p:txBody>
       </p:sp>
@@ -1977,7 +1978,7 @@
           <a:bodyPr/>
           <a:lstStyle/>
           <a:p>
-            <a:endParaRPr lang="ru-RU"/>
+            <a:endParaRPr lang="ru-RU" dirty="0"/>
           </a:p>
         </p:txBody>
       </p:sp>
@@ -2001,7 +2002,7 @@
               <a:pPr/>
               <a:t>‹#›</a:t>
             </a:fld>
-            <a:endParaRPr lang="ru-RU"/>
+            <a:endParaRPr lang="ru-RU" dirty="0"/>
           </a:p>
         </p:txBody>
       </p:sp>
@@ -2230,9 +2231,9 @@
             <a:fld id="{5B106E36-FD25-4E2D-B0AA-010F637433A0}" type="datetimeFigureOut">
               <a:rPr lang="ru-RU" smtClean="0"/>
               <a:pPr/>
-              <a:t>30.05.2020</a:t>
+              <a:t>14.06.2020</a:t>
             </a:fld>
-            <a:endParaRPr lang="ru-RU"/>
+            <a:endParaRPr lang="ru-RU" dirty="0"/>
           </a:p>
         </p:txBody>
       </p:sp>
@@ -2251,7 +2252,7 @@
           <a:bodyPr/>
           <a:lstStyle/>
           <a:p>
-            <a:endParaRPr lang="ru-RU"/>
+            <a:endParaRPr lang="ru-RU" dirty="0"/>
           </a:p>
         </p:txBody>
       </p:sp>
@@ -2275,7 +2276,7 @@
               <a:pPr/>
               <a:t>‹#›</a:t>
             </a:fld>
-            <a:endParaRPr lang="ru-RU"/>
+            <a:endParaRPr lang="ru-RU" dirty="0"/>
           </a:p>
         </p:txBody>
       </p:sp>
@@ -2393,7 +2394,7 @@
             </a:lvl9pPr>
           </a:lstStyle>
           <a:p>
-            <a:endParaRPr lang="ru-RU"/>
+            <a:endParaRPr lang="ru-RU" dirty="0"/>
           </a:p>
         </p:txBody>
       </p:sp>
@@ -2480,9 +2481,9 @@
             <a:fld id="{5B106E36-FD25-4E2D-B0AA-010F637433A0}" type="datetimeFigureOut">
               <a:rPr lang="ru-RU" smtClean="0"/>
               <a:pPr/>
-              <a:t>30.05.2020</a:t>
+              <a:t>14.06.2020</a:t>
             </a:fld>
-            <a:endParaRPr lang="ru-RU"/>
+            <a:endParaRPr lang="ru-RU" dirty="0"/>
           </a:p>
         </p:txBody>
       </p:sp>
@@ -2501,7 +2502,7 @@
           <a:bodyPr/>
           <a:lstStyle/>
           <a:p>
-            <a:endParaRPr lang="ru-RU"/>
+            <a:endParaRPr lang="ru-RU" dirty="0"/>
           </a:p>
         </p:txBody>
       </p:sp>
@@ -2525,7 +2526,7 @@
               <a:pPr/>
               <a:t>‹#›</a:t>
             </a:fld>
-            <a:endParaRPr lang="ru-RU"/>
+            <a:endParaRPr lang="ru-RU" dirty="0"/>
           </a:p>
         </p:txBody>
       </p:sp>
@@ -2690,9 +2691,9 @@
             <a:fld id="{5B106E36-FD25-4E2D-B0AA-010F637433A0}" type="datetimeFigureOut">
               <a:rPr lang="ru-RU" smtClean="0"/>
               <a:pPr/>
-              <a:t>30.05.2020</a:t>
+              <a:t>14.06.2020</a:t>
             </a:fld>
-            <a:endParaRPr lang="ru-RU"/>
+            <a:endParaRPr lang="ru-RU" dirty="0"/>
           </a:p>
         </p:txBody>
       </p:sp>
@@ -2729,7 +2730,7 @@
             </a:lvl1pPr>
           </a:lstStyle>
           <a:p>
-            <a:endParaRPr lang="ru-RU"/>
+            <a:endParaRPr lang="ru-RU" dirty="0"/>
           </a:p>
         </p:txBody>
       </p:sp>
@@ -2771,7 +2772,7 @@
               <a:pPr/>
               <a:t>‹#›</a:t>
             </a:fld>
-            <a:endParaRPr lang="ru-RU"/>
+            <a:endParaRPr lang="ru-RU" dirty="0"/>
           </a:p>
         </p:txBody>
       </p:sp>
@@ -3063,86 +3064,13 @@
       </p:grpSpPr>
       <p:sp>
         <p:nvSpPr>
-          <p:cNvPr id="2" name="Заголовок 1"/>
-          <p:cNvSpPr>
-            <a:spLocks noGrp="1"/>
-          </p:cNvSpPr>
-          <p:nvPr>
-            <p:ph type="title"/>
-          </p:nvPr>
-        </p:nvSpPr>
-        <p:spPr/>
-        <p:txBody>
-          <a:bodyPr/>
-          <a:lstStyle/>
-          <a:p>
-            <a:r>
-              <a:rPr lang="en-US" dirty="0" smtClean="0"/>
-              <a:t>Client</a:t>
-            </a:r>
-            <a:endParaRPr lang="ru-RU" dirty="0"/>
-          </a:p>
-        </p:txBody>
-      </p:sp>
-      <p:sp>
-        <p:nvSpPr>
-          <p:cNvPr id="4" name="Прямоугольник 3"/>
-          <p:cNvSpPr/>
-          <p:nvPr/>
-        </p:nvSpPr>
-        <p:spPr>
-          <a:xfrm>
-            <a:off x="0" y="2786058"/>
-            <a:ext cx="1571636" cy="1357322"/>
-          </a:xfrm>
-          <a:prstGeom prst="rect">
-            <a:avLst/>
-          </a:prstGeom>
-        </p:spPr>
-        <p:style>
-          <a:lnRef idx="2">
-            <a:schemeClr val="accent1">
-              <a:shade val="50000"/>
-            </a:schemeClr>
-          </a:lnRef>
-          <a:fillRef idx="1">
-            <a:schemeClr val="accent1"/>
-          </a:fillRef>
-          <a:effectRef idx="0">
-            <a:schemeClr val="accent1"/>
-          </a:effectRef>
-          <a:fontRef idx="minor">
-            <a:schemeClr val="lt1"/>
-          </a:fontRef>
-        </p:style>
-        <p:txBody>
-          <a:bodyPr rtlCol="0" anchor="ctr"/>
-          <a:lstStyle/>
-          <a:p>
-            <a:pPr algn="ctr"/>
-            <a:r>
-              <a:rPr lang="en-US" dirty="0" smtClean="0"/>
-              <a:t>Remote proxy</a:t>
-            </a:r>
-          </a:p>
-          <a:p>
-            <a:pPr algn="ctr"/>
-            <a:r>
-              <a:rPr lang="en-US" dirty="0" smtClean="0"/>
-              <a:t>(receive-send)</a:t>
-            </a:r>
-          </a:p>
-        </p:txBody>
-      </p:sp>
-      <p:sp>
-        <p:nvSpPr>
           <p:cNvPr id="5" name="Прямоугольник 4"/>
           <p:cNvSpPr/>
           <p:nvPr/>
         </p:nvSpPr>
         <p:spPr>
           <a:xfrm>
-            <a:off x="3500430" y="1643050"/>
+            <a:off x="1714480" y="1500174"/>
             <a:ext cx="5643570" cy="4286280"/>
           </a:xfrm>
           <a:prstGeom prst="rect">
@@ -3235,14 +3163,14 @@
       </p:sp>
       <p:sp>
         <p:nvSpPr>
-          <p:cNvPr id="6" name="Прямоугольник 5"/>
+          <p:cNvPr id="4" name="Прямоугольник 3"/>
           <p:cNvSpPr/>
           <p:nvPr/>
         </p:nvSpPr>
         <p:spPr>
           <a:xfrm>
-            <a:off x="6786578" y="2285992"/>
-            <a:ext cx="1071570" cy="642942"/>
+            <a:off x="1928794" y="2643182"/>
+            <a:ext cx="3357586" cy="2786082"/>
           </a:xfrm>
           <a:prstGeom prst="rect">
             <a:avLst/>
@@ -3271,25 +3199,80 @@
             <a:pPr algn="ctr"/>
             <a:r>
               <a:rPr lang="en-US" dirty="0" smtClean="0"/>
-              <a:t>Security</a:t>
-            </a:r>
-          </a:p>
-          <a:p>
-            <a:pPr algn="ctr"/>
-            <a:endParaRPr lang="ru-RU" dirty="0"/>
-          </a:p>
-        </p:txBody>
-      </p:sp>
-      <p:sp>
-        <p:nvSpPr>
-          <p:cNvPr id="11" name="Прямоугольник 10"/>
+              <a:t>Remote proxy</a:t>
+            </a:r>
+          </a:p>
+          <a:p>
+            <a:pPr algn="ctr"/>
+            <a:endParaRPr lang="en-US" dirty="0" smtClean="0"/>
+          </a:p>
+          <a:p>
+            <a:pPr algn="ctr"/>
+            <a:endParaRPr lang="en-US" dirty="0" smtClean="0"/>
+          </a:p>
+          <a:p>
+            <a:pPr algn="ctr"/>
+            <a:endParaRPr lang="ru-RU" dirty="0" smtClean="0"/>
+          </a:p>
+          <a:p>
+            <a:pPr algn="ctr"/>
+            <a:endParaRPr lang="ru-RU" dirty="0" smtClean="0"/>
+          </a:p>
+          <a:p>
+            <a:pPr algn="ctr"/>
+            <a:endParaRPr lang="ru-RU" dirty="0" smtClean="0"/>
+          </a:p>
+          <a:p>
+            <a:pPr algn="ctr"/>
+            <a:endParaRPr lang="ru-RU" dirty="0" smtClean="0"/>
+          </a:p>
+          <a:p>
+            <a:pPr algn="ctr"/>
+            <a:endParaRPr lang="ru-RU" dirty="0" smtClean="0"/>
+          </a:p>
+          <a:p>
+            <a:pPr algn="ctr"/>
+            <a:endParaRPr lang="en-US" dirty="0" smtClean="0"/>
+          </a:p>
+          <a:p>
+            <a:pPr algn="ctr"/>
+            <a:endParaRPr lang="en-US" dirty="0" smtClean="0"/>
+          </a:p>
+        </p:txBody>
+      </p:sp>
+      <p:sp>
+        <p:nvSpPr>
+          <p:cNvPr id="2" name="Заголовок 1"/>
+          <p:cNvSpPr>
+            <a:spLocks noGrp="1"/>
+          </p:cNvSpPr>
+          <p:nvPr>
+            <p:ph type="title"/>
+          </p:nvPr>
+        </p:nvSpPr>
+        <p:spPr/>
+        <p:txBody>
+          <a:bodyPr/>
+          <a:lstStyle/>
+          <a:p>
+            <a:r>
+              <a:rPr lang="en-US" dirty="0" smtClean="0"/>
+              <a:t>Client</a:t>
+            </a:r>
+            <a:endParaRPr lang="ru-RU" dirty="0"/>
+          </a:p>
+        </p:txBody>
+      </p:sp>
+      <p:sp>
+        <p:nvSpPr>
+          <p:cNvPr id="16" name="Прямоугольник 15"/>
           <p:cNvSpPr/>
           <p:nvPr/>
         </p:nvSpPr>
         <p:spPr>
           <a:xfrm>
-            <a:off x="5000628" y="4000504"/>
-            <a:ext cx="1071570" cy="642942"/>
+            <a:off x="5572132" y="3714752"/>
+            <a:ext cx="1714512" cy="785818"/>
           </a:xfrm>
           <a:prstGeom prst="rect">
             <a:avLst/>
@@ -3317,30 +3300,31 @@
           <a:p>
             <a:pPr algn="ctr"/>
             <a:r>
-              <a:rPr lang="en-US" dirty="0" smtClean="0"/>
-              <a:t>Encoding</a:t>
-            </a:r>
-          </a:p>
-          <a:p>
-            <a:pPr algn="ctr"/>
-            <a:r>
-              <a:rPr lang="en-US" dirty="0" smtClean="0"/>
-              <a:t>(out)</a:t>
-            </a:r>
-            <a:endParaRPr lang="ru-RU" dirty="0"/>
-          </a:p>
-        </p:txBody>
-      </p:sp>
-      <p:sp>
-        <p:nvSpPr>
-          <p:cNvPr id="16" name="Прямоугольник 15"/>
+              <a:rPr lang="en-US" dirty="0" err="1" smtClean="0"/>
+              <a:t>WorkManager</a:t>
+            </a:r>
+            <a:endParaRPr lang="en-US" dirty="0" smtClean="0"/>
+          </a:p>
+          <a:p>
+            <a:pPr algn="ctr"/>
+            <a:endParaRPr lang="en-US" dirty="0" smtClean="0"/>
+          </a:p>
+          <a:p>
+            <a:pPr algn="ctr"/>
+            <a:endParaRPr lang="ru-RU" dirty="0"/>
+          </a:p>
+        </p:txBody>
+      </p:sp>
+      <p:sp>
+        <p:nvSpPr>
+          <p:cNvPr id="15" name="Прямоугольник 14"/>
           <p:cNvSpPr/>
           <p:nvPr/>
         </p:nvSpPr>
         <p:spPr>
           <a:xfrm>
-            <a:off x="7143768" y="4714884"/>
-            <a:ext cx="1357322" cy="785818"/>
+            <a:off x="2928926" y="3786190"/>
+            <a:ext cx="1357322" cy="571504"/>
           </a:xfrm>
           <a:prstGeom prst="rect">
             <a:avLst/>
@@ -3369,232 +3353,22 @@
             <a:pPr algn="ctr"/>
             <a:r>
               <a:rPr lang="en-US" dirty="0" smtClean="0"/>
-              <a:t>Work</a:t>
-            </a:r>
-          </a:p>
-          <a:p>
-            <a:pPr algn="ctr"/>
-            <a:endParaRPr lang="en-US" dirty="0" smtClean="0"/>
-          </a:p>
-          <a:p>
-            <a:pPr algn="ctr"/>
-            <a:endParaRPr lang="ru-RU" dirty="0"/>
-          </a:p>
-        </p:txBody>
-      </p:sp>
-      <p:cxnSp>
-        <p:nvCxnSpPr>
-          <p:cNvPr id="18" name="Прямая со стрелкой 17"/>
-          <p:cNvCxnSpPr>
-            <a:stCxn id="44" idx="3"/>
-            <a:endCxn id="6" idx="1"/>
-          </p:cNvCxnSpPr>
-          <p:nvPr/>
-        </p:nvCxnSpPr>
-        <p:spPr>
-          <a:xfrm flipV="1">
-            <a:off x="6072198" y="2607463"/>
-            <a:ext cx="714380" cy="357190"/>
-          </a:xfrm>
-          <a:prstGeom prst="bentConnector3">
-            <a:avLst>
-              <a:gd name="adj1" fmla="val 50000"/>
-            </a:avLst>
-          </a:prstGeom>
-          <a:ln>
-            <a:solidFill>
-              <a:srgbClr val="FF0000"/>
-            </a:solidFill>
-            <a:tailEnd type="arrow"/>
-          </a:ln>
-        </p:spPr>
-        <p:style>
-          <a:lnRef idx="1">
-            <a:schemeClr val="accent1"/>
-          </a:lnRef>
-          <a:fillRef idx="0">
-            <a:schemeClr val="accent1"/>
-          </a:fillRef>
-          <a:effectRef idx="0">
-            <a:schemeClr val="accent1"/>
-          </a:effectRef>
-          <a:fontRef idx="minor">
-            <a:schemeClr val="tx1"/>
-          </a:fontRef>
-        </p:style>
-      </p:cxnSp>
-      <p:cxnSp>
-        <p:nvCxnSpPr>
-          <p:cNvPr id="20" name="Прямая со стрелкой 19"/>
-          <p:cNvCxnSpPr>
-            <a:stCxn id="16" idx="1"/>
-            <a:endCxn id="11" idx="3"/>
-          </p:cNvCxnSpPr>
-          <p:nvPr/>
-        </p:nvCxnSpPr>
-        <p:spPr>
-          <a:xfrm rot="10800000">
-            <a:off x="6072198" y="4321975"/>
-            <a:ext cx="1071570" cy="785818"/>
-          </a:xfrm>
-          <a:prstGeom prst="bentConnector3">
-            <a:avLst>
-              <a:gd name="adj1" fmla="val 50000"/>
-            </a:avLst>
-          </a:prstGeom>
-          <a:ln>
-            <a:solidFill>
-              <a:srgbClr val="FF0000"/>
-            </a:solidFill>
-            <a:tailEnd type="arrow"/>
-          </a:ln>
-        </p:spPr>
-        <p:style>
-          <a:lnRef idx="1">
-            <a:schemeClr val="accent1"/>
-          </a:lnRef>
-          <a:fillRef idx="0">
-            <a:schemeClr val="accent1"/>
-          </a:fillRef>
-          <a:effectRef idx="0">
-            <a:schemeClr val="accent1"/>
-          </a:effectRef>
-          <a:fontRef idx="minor">
-            <a:schemeClr val="tx1"/>
-          </a:fontRef>
-        </p:style>
-      </p:cxnSp>
-      <p:cxnSp>
-        <p:nvCxnSpPr>
-          <p:cNvPr id="22" name="Прямая со стрелкой 21"/>
-          <p:cNvCxnSpPr>
-            <a:stCxn id="11" idx="1"/>
-            <a:endCxn id="4" idx="2"/>
-          </p:cNvCxnSpPr>
-          <p:nvPr/>
-        </p:nvCxnSpPr>
-        <p:spPr>
-          <a:xfrm rot="10800000">
-            <a:off x="785818" y="4143381"/>
-            <a:ext cx="4214810" cy="178595"/>
-          </a:xfrm>
-          <a:prstGeom prst="bentConnector2">
-            <a:avLst/>
-          </a:prstGeom>
-          <a:ln>
-            <a:solidFill>
-              <a:srgbClr val="FF0000"/>
-            </a:solidFill>
-            <a:tailEnd type="arrow"/>
-          </a:ln>
-        </p:spPr>
-        <p:style>
-          <a:lnRef idx="1">
-            <a:schemeClr val="accent1"/>
-          </a:lnRef>
-          <a:fillRef idx="0">
-            <a:schemeClr val="accent1"/>
-          </a:fillRef>
-          <a:effectRef idx="0">
-            <a:schemeClr val="accent1"/>
-          </a:effectRef>
-          <a:fontRef idx="minor">
-            <a:schemeClr val="tx1"/>
-          </a:fontRef>
-        </p:style>
-      </p:cxnSp>
-      <p:cxnSp>
-        <p:nvCxnSpPr>
-          <p:cNvPr id="38" name="Прямая со стрелкой 37"/>
-          <p:cNvCxnSpPr>
-            <a:stCxn id="6" idx="2"/>
-            <a:endCxn id="16" idx="0"/>
-          </p:cNvCxnSpPr>
-          <p:nvPr/>
-        </p:nvCxnSpPr>
-        <p:spPr>
-          <a:xfrm rot="16200000" flipH="1">
-            <a:off x="6679421" y="3571876"/>
-            <a:ext cx="1785950" cy="500066"/>
-          </a:xfrm>
-          <a:prstGeom prst="bentConnector3">
-            <a:avLst>
-              <a:gd name="adj1" fmla="val 50000"/>
-            </a:avLst>
-          </a:prstGeom>
-          <a:ln>
-            <a:solidFill>
-              <a:srgbClr val="FF0000"/>
-            </a:solidFill>
-            <a:tailEnd type="arrow"/>
-          </a:ln>
-        </p:spPr>
-        <p:style>
-          <a:lnRef idx="1">
-            <a:schemeClr val="accent1"/>
-          </a:lnRef>
-          <a:fillRef idx="0">
-            <a:schemeClr val="accent1"/>
-          </a:fillRef>
-          <a:effectRef idx="0">
-            <a:schemeClr val="accent1"/>
-          </a:effectRef>
-          <a:fontRef idx="minor">
-            <a:schemeClr val="tx1"/>
-          </a:fontRef>
-        </p:style>
-      </p:cxnSp>
-      <p:cxnSp>
-        <p:nvCxnSpPr>
-          <p:cNvPr id="8" name="Прямая со стрелкой 7"/>
-          <p:cNvCxnSpPr>
-            <a:stCxn id="4" idx="3"/>
-            <a:endCxn id="44" idx="1"/>
-          </p:cNvCxnSpPr>
-          <p:nvPr/>
-        </p:nvCxnSpPr>
-        <p:spPr>
-          <a:xfrm flipV="1">
-            <a:off x="1571636" y="2964653"/>
-            <a:ext cx="3428992" cy="500066"/>
-          </a:xfrm>
-          <a:prstGeom prst="bentConnector3">
-            <a:avLst>
-              <a:gd name="adj1" fmla="val 50000"/>
-            </a:avLst>
-          </a:prstGeom>
-          <a:ln>
-            <a:solidFill>
-              <a:srgbClr val="FF0000"/>
-            </a:solidFill>
-            <a:tailEnd type="arrow"/>
-          </a:ln>
-        </p:spPr>
-        <p:style>
-          <a:lnRef idx="1">
-            <a:schemeClr val="accent1"/>
-          </a:lnRef>
-          <a:fillRef idx="0">
-            <a:schemeClr val="accent1"/>
-          </a:fillRef>
-          <a:effectRef idx="0">
-            <a:schemeClr val="accent1"/>
-          </a:effectRef>
-          <a:fontRef idx="minor">
-            <a:schemeClr val="tx1"/>
-          </a:fontRef>
-        </p:style>
-      </p:cxnSp>
-      <p:sp>
-        <p:nvSpPr>
-          <p:cNvPr id="44" name="Прямоугольник 43"/>
+              <a:t>Security</a:t>
+            </a:r>
+            <a:endParaRPr lang="ru-RU" dirty="0"/>
+          </a:p>
+        </p:txBody>
+      </p:sp>
+      <p:sp>
+        <p:nvSpPr>
+          <p:cNvPr id="14" name="Прямоугольник 13"/>
           <p:cNvSpPr/>
           <p:nvPr/>
         </p:nvSpPr>
         <p:spPr>
           <a:xfrm>
-            <a:off x="5000628" y="2643182"/>
-            <a:ext cx="1071570" cy="642942"/>
+            <a:off x="2000232" y="4714884"/>
+            <a:ext cx="1357322" cy="571504"/>
           </a:xfrm>
           <a:prstGeom prst="rect">
             <a:avLst/>
@@ -3625,17 +3399,226 @@
               <a:rPr lang="en-US" dirty="0" smtClean="0"/>
               <a:t>Encoding</a:t>
             </a:r>
-          </a:p>
+            <a:endParaRPr lang="ru-RU" dirty="0"/>
+          </a:p>
+        </p:txBody>
+      </p:sp>
+      <p:sp>
+        <p:nvSpPr>
+          <p:cNvPr id="29" name="Прямоугольник 28"/>
+          <p:cNvSpPr/>
+          <p:nvPr/>
+        </p:nvSpPr>
+        <p:spPr>
+          <a:xfrm>
+            <a:off x="3857620" y="4714884"/>
+            <a:ext cx="1357322" cy="571504"/>
+          </a:xfrm>
+          <a:prstGeom prst="rect">
+            <a:avLst/>
+          </a:prstGeom>
+        </p:spPr>
+        <p:style>
+          <a:lnRef idx="2">
+            <a:schemeClr val="accent1">
+              <a:shade val="50000"/>
+            </a:schemeClr>
+          </a:lnRef>
+          <a:fillRef idx="1">
+            <a:schemeClr val="accent1"/>
+          </a:fillRef>
+          <a:effectRef idx="0">
+            <a:schemeClr val="accent1"/>
+          </a:effectRef>
+          <a:fontRef idx="minor">
+            <a:schemeClr val="lt1"/>
+          </a:fontRef>
+        </p:style>
+        <p:txBody>
+          <a:bodyPr rtlCol="0" anchor="ctr"/>
+          <a:lstStyle/>
           <a:p>
             <a:pPr algn="ctr"/>
             <a:r>
               <a:rPr lang="en-US" dirty="0" smtClean="0"/>
-              <a:t>(in)</a:t>
-            </a:r>
-            <a:endParaRPr lang="ru-RU" dirty="0"/>
-          </a:p>
-        </p:txBody>
-      </p:sp>
+              <a:t>Connection</a:t>
+            </a:r>
+            <a:endParaRPr lang="ru-RU" dirty="0"/>
+          </a:p>
+        </p:txBody>
+      </p:sp>
+      <p:cxnSp>
+        <p:nvCxnSpPr>
+          <p:cNvPr id="31" name="Соединительная линия уступом 30"/>
+          <p:cNvCxnSpPr>
+            <a:stCxn id="4" idx="3"/>
+            <a:endCxn id="14" idx="0"/>
+          </p:cNvCxnSpPr>
+          <p:nvPr/>
+        </p:nvCxnSpPr>
+        <p:spPr>
+          <a:xfrm flipH="1">
+            <a:off x="2678893" y="4036223"/>
+            <a:ext cx="2607487" cy="678661"/>
+          </a:xfrm>
+          <a:prstGeom prst="bentConnector4">
+            <a:avLst>
+              <a:gd name="adj1" fmla="val 19832"/>
+              <a:gd name="adj2" fmla="val -127757"/>
+            </a:avLst>
+          </a:prstGeom>
+          <a:ln>
+            <a:solidFill>
+              <a:srgbClr val="FF0000"/>
+            </a:solidFill>
+            <a:headEnd type="arrow"/>
+            <a:tailEnd type="arrow"/>
+          </a:ln>
+        </p:spPr>
+        <p:style>
+          <a:lnRef idx="1">
+            <a:schemeClr val="accent1"/>
+          </a:lnRef>
+          <a:fillRef idx="0">
+            <a:schemeClr val="accent1"/>
+          </a:fillRef>
+          <a:effectRef idx="0">
+            <a:schemeClr val="accent1"/>
+          </a:effectRef>
+          <a:fontRef idx="minor">
+            <a:schemeClr val="tx1"/>
+          </a:fontRef>
+        </p:style>
+      </p:cxnSp>
+      <p:cxnSp>
+        <p:nvCxnSpPr>
+          <p:cNvPr id="33" name="Соединительная линия уступом 32"/>
+          <p:cNvCxnSpPr>
+            <a:stCxn id="4" idx="3"/>
+            <a:endCxn id="15" idx="0"/>
+          </p:cNvCxnSpPr>
+          <p:nvPr/>
+        </p:nvCxnSpPr>
+        <p:spPr>
+          <a:xfrm flipH="1" flipV="1">
+            <a:off x="3607587" y="3786190"/>
+            <a:ext cx="1678793" cy="250033"/>
+          </a:xfrm>
+          <a:prstGeom prst="bentConnector4">
+            <a:avLst>
+              <a:gd name="adj1" fmla="val 41909"/>
+              <a:gd name="adj2" fmla="val 236702"/>
+            </a:avLst>
+          </a:prstGeom>
+          <a:ln>
+            <a:solidFill>
+              <a:srgbClr val="FF0000"/>
+            </a:solidFill>
+            <a:headEnd type="arrow"/>
+            <a:tailEnd type="arrow"/>
+          </a:ln>
+        </p:spPr>
+        <p:style>
+          <a:lnRef idx="1">
+            <a:schemeClr val="accent1"/>
+          </a:lnRef>
+          <a:fillRef idx="0">
+            <a:schemeClr val="accent1"/>
+          </a:fillRef>
+          <a:effectRef idx="0">
+            <a:schemeClr val="accent1"/>
+          </a:effectRef>
+          <a:fontRef idx="minor">
+            <a:schemeClr val="tx1"/>
+          </a:fontRef>
+        </p:style>
+      </p:cxnSp>
+      <p:cxnSp>
+        <p:nvCxnSpPr>
+          <p:cNvPr id="35" name="Соединительная линия уступом 34"/>
+          <p:cNvCxnSpPr>
+            <a:stCxn id="4" idx="3"/>
+            <a:endCxn id="29" idx="0"/>
+          </p:cNvCxnSpPr>
+          <p:nvPr/>
+        </p:nvCxnSpPr>
+        <p:spPr>
+          <a:xfrm flipH="1">
+            <a:off x="4536281" y="4036223"/>
+            <a:ext cx="750099" cy="678661"/>
+          </a:xfrm>
+          <a:prstGeom prst="bentConnector4">
+            <a:avLst>
+              <a:gd name="adj1" fmla="val 68941"/>
+              <a:gd name="adj2" fmla="val 59303"/>
+            </a:avLst>
+          </a:prstGeom>
+          <a:ln>
+            <a:solidFill>
+              <a:srgbClr val="FF0000"/>
+            </a:solidFill>
+            <a:headEnd type="arrow"/>
+            <a:tailEnd type="arrow"/>
+          </a:ln>
+        </p:spPr>
+        <p:style>
+          <a:lnRef idx="1">
+            <a:schemeClr val="accent1"/>
+          </a:lnRef>
+          <a:fillRef idx="0">
+            <a:schemeClr val="accent1"/>
+          </a:fillRef>
+          <a:effectRef idx="0">
+            <a:schemeClr val="accent1"/>
+          </a:effectRef>
+          <a:fontRef idx="minor">
+            <a:schemeClr val="tx1"/>
+          </a:fontRef>
+        </p:style>
+      </p:cxnSp>
+      <p:cxnSp>
+        <p:nvCxnSpPr>
+          <p:cNvPr id="47" name="Соединительная линия уступом 46"/>
+          <p:cNvCxnSpPr>
+            <a:stCxn id="16" idx="0"/>
+            <a:endCxn id="4" idx="3"/>
+          </p:cNvCxnSpPr>
+          <p:nvPr/>
+        </p:nvCxnSpPr>
+        <p:spPr>
+          <a:xfrm rot="16200000" flipH="1" flipV="1">
+            <a:off x="5697148" y="3303983"/>
+            <a:ext cx="321471" cy="1143008"/>
+          </a:xfrm>
+          <a:prstGeom prst="bentConnector4">
+            <a:avLst>
+              <a:gd name="adj1" fmla="val -71111"/>
+              <a:gd name="adj2" fmla="val 87500"/>
+            </a:avLst>
+          </a:prstGeom>
+          <a:ln>
+            <a:solidFill>
+              <a:srgbClr val="FF0000"/>
+            </a:solidFill>
+            <a:headEnd type="arrow"/>
+            <a:tailEnd type="arrow"/>
+          </a:ln>
+        </p:spPr>
+        <p:style>
+          <a:lnRef idx="1">
+            <a:schemeClr val="accent1"/>
+          </a:lnRef>
+          <a:fillRef idx="0">
+            <a:schemeClr val="accent1"/>
+          </a:fillRef>
+          <a:effectRef idx="0">
+            <a:schemeClr val="accent1"/>
+          </a:effectRef>
+          <a:fontRef idx="minor">
+            <a:schemeClr val="tx1"/>
+          </a:fontRef>
+        </p:style>
+      </p:cxnSp>
     </p:spTree>
   </p:cSld>
   <p:clrMapOvr>
@@ -3678,7 +3661,7 @@
           <a:p>
             <a:r>
               <a:rPr lang="en-US" dirty="0" smtClean="0"/>
-              <a:t>Proxy</a:t>
+              <a:t>Protocols</a:t>
             </a:r>
             <a:endParaRPr lang="ru-RU" dirty="0"/>
           </a:p>
@@ -3692,8 +3675,8 @@
         </p:nvSpPr>
         <p:spPr>
           <a:xfrm>
-            <a:off x="0" y="2786058"/>
-            <a:ext cx="1571636" cy="1357322"/>
+            <a:off x="428596" y="1428736"/>
+            <a:ext cx="8286808" cy="785818"/>
           </a:xfrm>
           <a:prstGeom prst="rect">
             <a:avLst/>
@@ -3719,18 +3702,57 @@
           <a:bodyPr rtlCol="0" anchor="ctr"/>
           <a:lstStyle/>
           <a:p>
-            <a:pPr algn="ctr"/>
+            <a:pPr>
+              <a:buFont typeface="Arial" pitchFamily="34" charset="0"/>
+              <a:buChar char="•"/>
+            </a:pPr>
+            <a:r>
+              <a:rPr lang="en-US" dirty="0" err="1" smtClean="0"/>
+              <a:t>GetWorkSeed</a:t>
+            </a:r>
             <a:r>
               <a:rPr lang="en-US" dirty="0" smtClean="0"/>
-              <a:t>Remote client</a:t>
-            </a:r>
-          </a:p>
-          <a:p>
-            <a:pPr algn="ctr"/>
+              <a:t>{</a:t>
+            </a:r>
+            <a:r>
+              <a:rPr lang="en-US" dirty="0" err="1" smtClean="0"/>
+              <a:t>WorkID</a:t>
+            </a:r>
             <a:r>
               <a:rPr lang="en-US" dirty="0" smtClean="0"/>
-              <a:t>(receive-send)</a:t>
-            </a:r>
+              <a:t>}</a:t>
+            </a:r>
+          </a:p>
+          <a:p>
+            <a:pPr algn="r">
+              <a:buFont typeface="Arial" pitchFamily="34" charset="0"/>
+              <a:buChar char="•"/>
+            </a:pPr>
+            <a:r>
+              <a:rPr lang="en-US" dirty="0" err="1" smtClean="0"/>
+              <a:t>ReceiveWorkSeed</a:t>
+            </a:r>
+            <a:r>
+              <a:rPr lang="en-US" dirty="0" smtClean="0"/>
+              <a:t>{</a:t>
+            </a:r>
+            <a:r>
+              <a:rPr lang="en-US" dirty="0" err="1" smtClean="0"/>
+              <a:t>WorkID</a:t>
+            </a:r>
+            <a:r>
+              <a:rPr lang="en-US" dirty="0" smtClean="0"/>
+              <a:t>, </a:t>
+            </a:r>
+            <a:r>
+              <a:rPr lang="en-US" dirty="0" err="1" smtClean="0"/>
+              <a:t>WorkSeed</a:t>
+            </a:r>
+            <a:r>
+              <a:rPr lang="en-US" dirty="0" smtClean="0"/>
+              <a:t>}</a:t>
+            </a:r>
+            <a:endParaRPr lang="ru-RU" dirty="0"/>
           </a:p>
         </p:txBody>
       </p:sp>
@@ -3742,8 +3764,8 @@
         </p:nvSpPr>
         <p:spPr>
           <a:xfrm>
-            <a:off x="1785918" y="1500174"/>
-            <a:ext cx="5500726" cy="4643470"/>
+            <a:off x="428596" y="2357430"/>
+            <a:ext cx="8286808" cy="500066"/>
           </a:xfrm>
           <a:prstGeom prst="rect">
             <a:avLst/>
@@ -3769,88 +3791,48 @@
           <a:bodyPr rtlCol="0" anchor="ctr"/>
           <a:lstStyle/>
           <a:p>
-            <a:pPr algn="ctr"/>
+            <a:pPr>
+              <a:buFont typeface="Arial" pitchFamily="34" charset="0"/>
+              <a:buChar char="•"/>
+            </a:pPr>
+            <a:r>
+              <a:rPr lang="en-US" dirty="0" err="1" smtClean="0"/>
+              <a:t>SendWorkResult</a:t>
+            </a:r>
             <a:r>
               <a:rPr lang="en-US" dirty="0" smtClean="0"/>
-              <a:t>Proxy</a:t>
-            </a:r>
-          </a:p>
-          <a:p>
-            <a:pPr algn="ctr"/>
-            <a:endParaRPr lang="en-US" dirty="0" smtClean="0"/>
-          </a:p>
-          <a:p>
-            <a:pPr algn="ctr"/>
-            <a:endParaRPr lang="en-US" dirty="0" smtClean="0"/>
-          </a:p>
-          <a:p>
-            <a:pPr algn="ctr"/>
-            <a:endParaRPr lang="en-US" dirty="0" smtClean="0"/>
-          </a:p>
-          <a:p>
-            <a:pPr algn="ctr"/>
-            <a:endParaRPr lang="en-US" dirty="0" smtClean="0"/>
-          </a:p>
-          <a:p>
-            <a:pPr algn="ctr"/>
-            <a:endParaRPr lang="en-US" dirty="0" smtClean="0"/>
-          </a:p>
-          <a:p>
-            <a:pPr algn="ctr"/>
-            <a:endParaRPr lang="en-US" dirty="0" smtClean="0"/>
-          </a:p>
-          <a:p>
-            <a:pPr algn="ctr"/>
-            <a:endParaRPr lang="en-US" dirty="0" smtClean="0"/>
-          </a:p>
-          <a:p>
-            <a:pPr algn="ctr"/>
-            <a:endParaRPr lang="en-US" dirty="0" smtClean="0"/>
-          </a:p>
-          <a:p>
-            <a:pPr algn="ctr"/>
-            <a:endParaRPr lang="en-US" dirty="0" smtClean="0"/>
-          </a:p>
-          <a:p>
-            <a:pPr algn="ctr"/>
-            <a:endParaRPr lang="en-US" dirty="0" smtClean="0"/>
-          </a:p>
-          <a:p>
-            <a:pPr algn="ctr"/>
-            <a:endParaRPr lang="en-US" dirty="0" smtClean="0"/>
-          </a:p>
-          <a:p>
-            <a:pPr algn="ctr"/>
-            <a:endParaRPr lang="en-US" dirty="0" smtClean="0"/>
-          </a:p>
-          <a:p>
-            <a:pPr algn="ctr"/>
-            <a:endParaRPr lang="en-US" dirty="0" smtClean="0"/>
-          </a:p>
-          <a:p>
-            <a:pPr algn="ctr"/>
-            <a:endParaRPr lang="en-US" dirty="0" smtClean="0"/>
-          </a:p>
-          <a:p>
-            <a:pPr algn="ctr"/>
-            <a:endParaRPr lang="en-US" dirty="0" smtClean="0"/>
-          </a:p>
-          <a:p>
-            <a:pPr algn="ctr"/>
-            <a:endParaRPr lang="ru-RU" dirty="0"/>
-          </a:p>
-        </p:txBody>
-      </p:sp>
-      <p:sp>
-        <p:nvSpPr>
-          <p:cNvPr id="6" name="Прямоугольник 5"/>
+              <a:t>{</a:t>
+            </a:r>
+            <a:r>
+              <a:rPr lang="en-US" dirty="0" err="1" smtClean="0"/>
+              <a:t>WorkID</a:t>
+            </a:r>
+            <a:r>
+              <a:rPr lang="en-US" dirty="0" smtClean="0"/>
+              <a:t>, </a:t>
+            </a:r>
+            <a:r>
+              <a:rPr lang="en-US" dirty="0" err="1" smtClean="0"/>
+              <a:t>WorkResult</a:t>
+            </a:r>
+            <a:r>
+              <a:rPr lang="en-US" dirty="0" smtClean="0"/>
+              <a:t>}</a:t>
+            </a:r>
+            <a:endParaRPr lang="ru-RU" dirty="0"/>
+          </a:p>
+        </p:txBody>
+      </p:sp>
+      <p:sp>
+        <p:nvSpPr>
+          <p:cNvPr id="7" name="Прямоугольник 6"/>
           <p:cNvSpPr/>
           <p:nvPr/>
         </p:nvSpPr>
         <p:spPr>
           <a:xfrm>
-            <a:off x="4857752" y="2928934"/>
-            <a:ext cx="1071570" cy="642942"/>
+            <a:off x="428596" y="3000372"/>
+            <a:ext cx="8286808" cy="785818"/>
           </a:xfrm>
           <a:prstGeom prst="rect">
             <a:avLst/>
@@ -3876,373 +3858,55 @@
           <a:bodyPr rtlCol="0" anchor="ctr"/>
           <a:lstStyle/>
           <a:p>
-            <a:pPr algn="ctr"/>
+            <a:pPr>
+              <a:buFont typeface="Arial" pitchFamily="34" charset="0"/>
+              <a:buChar char="•"/>
+            </a:pPr>
+            <a:r>
+              <a:rPr lang="en-US" dirty="0" err="1" smtClean="0"/>
+              <a:t>GetWorkCode</a:t>
+            </a:r>
             <a:r>
               <a:rPr lang="en-US" dirty="0" smtClean="0"/>
-              <a:t>Security</a:t>
-            </a:r>
-          </a:p>
-          <a:p>
-            <a:pPr algn="ctr"/>
-            <a:endParaRPr lang="ru-RU" dirty="0"/>
-          </a:p>
-        </p:txBody>
-      </p:sp>
-      <p:sp>
-        <p:nvSpPr>
-          <p:cNvPr id="7" name="Прямоугольник 6"/>
-          <p:cNvSpPr/>
-          <p:nvPr/>
-        </p:nvSpPr>
-        <p:spPr>
-          <a:xfrm>
-            <a:off x="3000364" y="2714620"/>
-            <a:ext cx="1071570" cy="642942"/>
-          </a:xfrm>
-          <a:prstGeom prst="rect">
-            <a:avLst/>
-          </a:prstGeom>
-        </p:spPr>
-        <p:style>
-          <a:lnRef idx="2">
-            <a:schemeClr val="accent1">
-              <a:shade val="50000"/>
-            </a:schemeClr>
-          </a:lnRef>
-          <a:fillRef idx="1">
-            <a:schemeClr val="accent1"/>
-          </a:fillRef>
-          <a:effectRef idx="0">
-            <a:schemeClr val="accent1"/>
-          </a:effectRef>
-          <a:fontRef idx="minor">
-            <a:schemeClr val="lt1"/>
-          </a:fontRef>
-        </p:style>
-        <p:txBody>
-          <a:bodyPr rtlCol="0" anchor="ctr"/>
-          <a:lstStyle/>
-          <a:p>
-            <a:pPr algn="ctr"/>
+              <a:t>{</a:t>
+            </a:r>
+            <a:r>
+              <a:rPr lang="en-US" dirty="0" err="1" smtClean="0"/>
+              <a:t>WorkID</a:t>
+            </a:r>
             <a:r>
               <a:rPr lang="en-US" dirty="0" smtClean="0"/>
-              <a:t>Encoding</a:t>
-            </a:r>
-          </a:p>
-          <a:p>
-            <a:pPr algn="ctr"/>
+              <a:t>}</a:t>
+            </a:r>
+          </a:p>
+          <a:p>
+            <a:pPr algn="r">
+              <a:buFont typeface="Arial" pitchFamily="34" charset="0"/>
+              <a:buChar char="•"/>
+            </a:pPr>
+            <a:r>
+              <a:rPr lang="en-US" dirty="0" err="1" smtClean="0"/>
+              <a:t>ReceiveWorkCode</a:t>
+            </a:r>
             <a:r>
               <a:rPr lang="en-US" dirty="0" smtClean="0"/>
-              <a:t>(in)</a:t>
-            </a:r>
-            <a:endParaRPr lang="ru-RU" dirty="0"/>
-          </a:p>
-        </p:txBody>
-      </p:sp>
-      <p:cxnSp>
-        <p:nvCxnSpPr>
-          <p:cNvPr id="9" name="Прямая со стрелкой 8"/>
-          <p:cNvCxnSpPr>
-            <a:stCxn id="7" idx="3"/>
-            <a:endCxn id="6" idx="1"/>
-          </p:cNvCxnSpPr>
-          <p:nvPr/>
-        </p:nvCxnSpPr>
-        <p:spPr>
-          <a:xfrm>
-            <a:off x="4071934" y="3036091"/>
-            <a:ext cx="785818" cy="214314"/>
-          </a:xfrm>
-          <a:prstGeom prst="bentConnector3">
-            <a:avLst>
-              <a:gd name="adj1" fmla="val 50000"/>
-            </a:avLst>
-          </a:prstGeom>
-          <a:ln>
-            <a:solidFill>
-              <a:srgbClr val="FF0000"/>
-            </a:solidFill>
-            <a:tailEnd type="arrow"/>
-          </a:ln>
-        </p:spPr>
-        <p:style>
-          <a:lnRef idx="1">
-            <a:schemeClr val="accent1"/>
-          </a:lnRef>
-          <a:fillRef idx="0">
-            <a:schemeClr val="accent1"/>
-          </a:fillRef>
-          <a:effectRef idx="0">
-            <a:schemeClr val="accent1"/>
-          </a:effectRef>
-          <a:fontRef idx="minor">
-            <a:schemeClr val="tx1"/>
-          </a:fontRef>
-        </p:style>
-      </p:cxnSp>
-      <p:cxnSp>
-        <p:nvCxnSpPr>
-          <p:cNvPr id="11" name="Прямая со стрелкой 10"/>
-          <p:cNvCxnSpPr>
-            <a:stCxn id="40" idx="1"/>
-            <a:endCxn id="4" idx="2"/>
-          </p:cNvCxnSpPr>
-          <p:nvPr/>
-        </p:nvCxnSpPr>
-        <p:spPr>
-          <a:xfrm rot="10800000" flipV="1">
-            <a:off x="785818" y="4107660"/>
-            <a:ext cx="2214546" cy="35719"/>
-          </a:xfrm>
-          <a:prstGeom prst="bentConnector4">
-            <a:avLst>
-              <a:gd name="adj1" fmla="val 32258"/>
-              <a:gd name="adj2" fmla="val 1539996"/>
-            </a:avLst>
-          </a:prstGeom>
-          <a:ln>
-            <a:solidFill>
-              <a:srgbClr val="FF0000"/>
-            </a:solidFill>
-            <a:tailEnd type="arrow"/>
-          </a:ln>
-        </p:spPr>
-        <p:style>
-          <a:lnRef idx="1">
-            <a:schemeClr val="accent1"/>
-          </a:lnRef>
-          <a:fillRef idx="0">
-            <a:schemeClr val="accent1"/>
-          </a:fillRef>
-          <a:effectRef idx="0">
-            <a:schemeClr val="accent1"/>
-          </a:effectRef>
-          <a:fontRef idx="minor">
-            <a:schemeClr val="tx1"/>
-          </a:fontRef>
-        </p:style>
-      </p:cxnSp>
-      <p:cxnSp>
-        <p:nvCxnSpPr>
-          <p:cNvPr id="12" name="Прямая со стрелкой 11"/>
-          <p:cNvCxnSpPr>
-            <a:stCxn id="6" idx="3"/>
-            <a:endCxn id="26" idx="1"/>
-          </p:cNvCxnSpPr>
-          <p:nvPr/>
-        </p:nvCxnSpPr>
-        <p:spPr>
-          <a:xfrm>
-            <a:off x="5929322" y="3250405"/>
-            <a:ext cx="1643042" cy="214314"/>
-          </a:xfrm>
-          <a:prstGeom prst="bentConnector3">
-            <a:avLst>
-              <a:gd name="adj1" fmla="val 50000"/>
-            </a:avLst>
-          </a:prstGeom>
-          <a:ln>
-            <a:solidFill>
-              <a:srgbClr val="FF0000"/>
-            </a:solidFill>
-            <a:tailEnd type="arrow"/>
-          </a:ln>
-        </p:spPr>
-        <p:style>
-          <a:lnRef idx="1">
-            <a:schemeClr val="accent1"/>
-          </a:lnRef>
-          <a:fillRef idx="0">
-            <a:schemeClr val="accent1"/>
-          </a:fillRef>
-          <a:effectRef idx="0">
-            <a:schemeClr val="accent1"/>
-          </a:effectRef>
-          <a:fontRef idx="minor">
-            <a:schemeClr val="tx1"/>
-          </a:fontRef>
-        </p:style>
-      </p:cxnSp>
-      <p:cxnSp>
-        <p:nvCxnSpPr>
-          <p:cNvPr id="13" name="Прямая со стрелкой 12"/>
-          <p:cNvCxnSpPr>
-            <a:stCxn id="4" idx="3"/>
-            <a:endCxn id="7" idx="0"/>
-          </p:cNvCxnSpPr>
-          <p:nvPr/>
-        </p:nvCxnSpPr>
-        <p:spPr>
-          <a:xfrm flipV="1">
-            <a:off x="1571636" y="2714620"/>
-            <a:ext cx="1964513" cy="750099"/>
-          </a:xfrm>
-          <a:prstGeom prst="bentConnector4">
-            <a:avLst>
-              <a:gd name="adj1" fmla="val 36363"/>
-              <a:gd name="adj2" fmla="val 130476"/>
-            </a:avLst>
-          </a:prstGeom>
-          <a:ln>
-            <a:solidFill>
-              <a:srgbClr val="FF0000"/>
-            </a:solidFill>
-            <a:tailEnd type="arrow"/>
-          </a:ln>
-        </p:spPr>
-        <p:style>
-          <a:lnRef idx="1">
-            <a:schemeClr val="accent1"/>
-          </a:lnRef>
-          <a:fillRef idx="0">
-            <a:schemeClr val="accent1"/>
-          </a:fillRef>
-          <a:effectRef idx="0">
-            <a:schemeClr val="accent1"/>
-          </a:effectRef>
-          <a:fontRef idx="minor">
-            <a:schemeClr val="tx1"/>
-          </a:fontRef>
-        </p:style>
-      </p:cxnSp>
-      <p:sp>
-        <p:nvSpPr>
-          <p:cNvPr id="26" name="Прямоугольник 25"/>
-          <p:cNvSpPr/>
-          <p:nvPr/>
-        </p:nvSpPr>
-        <p:spPr>
-          <a:xfrm>
-            <a:off x="7572364" y="2786058"/>
-            <a:ext cx="1571636" cy="1357322"/>
-          </a:xfrm>
-          <a:prstGeom prst="rect">
-            <a:avLst/>
-          </a:prstGeom>
-        </p:spPr>
-        <p:style>
-          <a:lnRef idx="2">
-            <a:schemeClr val="accent1">
-              <a:shade val="50000"/>
-            </a:schemeClr>
-          </a:lnRef>
-          <a:fillRef idx="1">
-            <a:schemeClr val="accent1"/>
-          </a:fillRef>
-          <a:effectRef idx="0">
-            <a:schemeClr val="accent1"/>
-          </a:effectRef>
-          <a:fontRef idx="minor">
-            <a:schemeClr val="lt1"/>
-          </a:fontRef>
-        </p:style>
-        <p:txBody>
-          <a:bodyPr rtlCol="0" anchor="ctr"/>
-          <a:lstStyle/>
-          <a:p>
-            <a:pPr algn="ctr"/>
+              <a:t>{</a:t>
+            </a:r>
+            <a:r>
+              <a:rPr lang="en-US" dirty="0" err="1" smtClean="0"/>
+              <a:t>WorkID</a:t>
+            </a:r>
             <a:r>
               <a:rPr lang="en-US" dirty="0" smtClean="0"/>
-              <a:t>Remote database</a:t>
-            </a:r>
-          </a:p>
-          <a:p>
-            <a:pPr algn="ctr"/>
+              <a:t>, </a:t>
+            </a:r>
+            <a:r>
+              <a:rPr lang="en-US" dirty="0" err="1" smtClean="0"/>
+              <a:t>WorkCode</a:t>
+            </a:r>
             <a:r>
               <a:rPr lang="en-US" dirty="0" smtClean="0"/>
-              <a:t>(receive-send)</a:t>
-            </a:r>
-          </a:p>
-        </p:txBody>
-      </p:sp>
-      <p:cxnSp>
-        <p:nvCxnSpPr>
-          <p:cNvPr id="10" name="Прямая со стрелкой 9"/>
-          <p:cNvCxnSpPr>
-            <a:stCxn id="26" idx="2"/>
-            <a:endCxn id="40" idx="3"/>
-          </p:cNvCxnSpPr>
-          <p:nvPr/>
-        </p:nvCxnSpPr>
-        <p:spPr>
-          <a:xfrm rot="5400000" flipH="1">
-            <a:off x="6197198" y="1982397"/>
-            <a:ext cx="35719" cy="4286248"/>
-          </a:xfrm>
-          <a:prstGeom prst="bentConnector4">
-            <a:avLst>
-              <a:gd name="adj1" fmla="val -639996"/>
-              <a:gd name="adj2" fmla="val 59167"/>
-            </a:avLst>
-          </a:prstGeom>
-          <a:ln>
-            <a:solidFill>
-              <a:srgbClr val="FF0000"/>
-            </a:solidFill>
-            <a:tailEnd type="arrow"/>
-          </a:ln>
-        </p:spPr>
-        <p:style>
-          <a:lnRef idx="1">
-            <a:schemeClr val="accent1"/>
-          </a:lnRef>
-          <a:fillRef idx="0">
-            <a:schemeClr val="accent1"/>
-          </a:fillRef>
-          <a:effectRef idx="0">
-            <a:schemeClr val="accent1"/>
-          </a:effectRef>
-          <a:fontRef idx="minor">
-            <a:schemeClr val="tx1"/>
-          </a:fontRef>
-        </p:style>
-      </p:cxnSp>
-      <p:sp>
-        <p:nvSpPr>
-          <p:cNvPr id="40" name="Прямоугольник 39"/>
-          <p:cNvSpPr/>
-          <p:nvPr/>
-        </p:nvSpPr>
-        <p:spPr>
-          <a:xfrm>
-            <a:off x="3000364" y="3786190"/>
-            <a:ext cx="1071570" cy="642942"/>
-          </a:xfrm>
-          <a:prstGeom prst="rect">
-            <a:avLst/>
-          </a:prstGeom>
-        </p:spPr>
-        <p:style>
-          <a:lnRef idx="2">
-            <a:schemeClr val="accent1">
-              <a:shade val="50000"/>
-            </a:schemeClr>
-          </a:lnRef>
-          <a:fillRef idx="1">
-            <a:schemeClr val="accent1"/>
-          </a:fillRef>
-          <a:effectRef idx="0">
-            <a:schemeClr val="accent1"/>
-          </a:effectRef>
-          <a:fontRef idx="minor">
-            <a:schemeClr val="lt1"/>
-          </a:fontRef>
-        </p:style>
-        <p:txBody>
-          <a:bodyPr rtlCol="0" anchor="ctr"/>
-          <a:lstStyle/>
-          <a:p>
-            <a:pPr algn="ctr"/>
-            <a:r>
-              <a:rPr lang="en-US" dirty="0" smtClean="0"/>
-              <a:t>Encoding</a:t>
-            </a:r>
-          </a:p>
-          <a:p>
-            <a:pPr algn="ctr"/>
-            <a:r>
-              <a:rPr lang="en-US" dirty="0" smtClean="0"/>
-              <a:t>(out)</a:t>
+              <a:t>}</a:t>
             </a:r>
             <a:endParaRPr lang="ru-RU" dirty="0"/>
           </a:p>
@@ -4275,6 +3939,113 @@
       </p:grpSpPr>
       <p:sp>
         <p:nvSpPr>
+          <p:cNvPr id="5" name="Прямоугольник 4"/>
+          <p:cNvSpPr/>
+          <p:nvPr/>
+        </p:nvSpPr>
+        <p:spPr>
+          <a:xfrm>
+            <a:off x="1000100" y="1500174"/>
+            <a:ext cx="6500858" cy="4643470"/>
+          </a:xfrm>
+          <a:prstGeom prst="rect">
+            <a:avLst/>
+          </a:prstGeom>
+        </p:spPr>
+        <p:style>
+          <a:lnRef idx="2">
+            <a:schemeClr val="accent1">
+              <a:shade val="50000"/>
+            </a:schemeClr>
+          </a:lnRef>
+          <a:fillRef idx="1">
+            <a:schemeClr val="accent1"/>
+          </a:fillRef>
+          <a:effectRef idx="0">
+            <a:schemeClr val="accent1"/>
+          </a:effectRef>
+          <a:fontRef idx="minor">
+            <a:schemeClr val="lt1"/>
+          </a:fontRef>
+        </p:style>
+        <p:txBody>
+          <a:bodyPr rtlCol="0" anchor="ctr"/>
+          <a:lstStyle/>
+          <a:p>
+            <a:pPr algn="ctr"/>
+            <a:r>
+              <a:rPr lang="en-US" dirty="0" smtClean="0"/>
+              <a:t>Proxy</a:t>
+            </a:r>
+          </a:p>
+          <a:p>
+            <a:pPr algn="ctr"/>
+            <a:endParaRPr lang="en-US" dirty="0" smtClean="0"/>
+          </a:p>
+          <a:p>
+            <a:pPr algn="ctr"/>
+            <a:endParaRPr lang="en-US" dirty="0" smtClean="0"/>
+          </a:p>
+          <a:p>
+            <a:pPr algn="ctr"/>
+            <a:endParaRPr lang="en-US" dirty="0" smtClean="0"/>
+          </a:p>
+          <a:p>
+            <a:pPr algn="ctr"/>
+            <a:endParaRPr lang="en-US" dirty="0" smtClean="0"/>
+          </a:p>
+          <a:p>
+            <a:pPr algn="ctr"/>
+            <a:endParaRPr lang="en-US" dirty="0" smtClean="0"/>
+          </a:p>
+          <a:p>
+            <a:pPr algn="ctr"/>
+            <a:endParaRPr lang="en-US" dirty="0" smtClean="0"/>
+          </a:p>
+          <a:p>
+            <a:pPr algn="ctr"/>
+            <a:endParaRPr lang="en-US" dirty="0" smtClean="0"/>
+          </a:p>
+          <a:p>
+            <a:pPr algn="ctr"/>
+            <a:endParaRPr lang="en-US" dirty="0" smtClean="0"/>
+          </a:p>
+          <a:p>
+            <a:pPr algn="ctr"/>
+            <a:endParaRPr lang="en-US" dirty="0" smtClean="0"/>
+          </a:p>
+          <a:p>
+            <a:pPr algn="ctr"/>
+            <a:endParaRPr lang="en-US" dirty="0" smtClean="0"/>
+          </a:p>
+          <a:p>
+            <a:pPr algn="ctr"/>
+            <a:endParaRPr lang="en-US" dirty="0" smtClean="0"/>
+          </a:p>
+          <a:p>
+            <a:pPr algn="ctr"/>
+            <a:endParaRPr lang="en-US" dirty="0" smtClean="0"/>
+          </a:p>
+          <a:p>
+            <a:pPr algn="ctr"/>
+            <a:endParaRPr lang="en-US" dirty="0" smtClean="0"/>
+          </a:p>
+          <a:p>
+            <a:pPr algn="ctr"/>
+            <a:endParaRPr lang="en-US" dirty="0" smtClean="0"/>
+          </a:p>
+          <a:p>
+            <a:pPr algn="ctr"/>
+            <a:endParaRPr lang="en-US" dirty="0" smtClean="0"/>
+          </a:p>
+          <a:p>
+            <a:pPr algn="ctr"/>
+            <a:endParaRPr lang="ru-RU" dirty="0"/>
+          </a:p>
+        </p:txBody>
+      </p:sp>
+      <p:sp>
+        <p:nvSpPr>
           <p:cNvPr id="2" name="Заголовок 1"/>
           <p:cNvSpPr>
             <a:spLocks noGrp="1"/>
@@ -4290,7 +4061,7 @@
           <a:p>
             <a:r>
               <a:rPr lang="en-US" dirty="0" smtClean="0"/>
-              <a:t>Database</a:t>
+              <a:t>Proxy</a:t>
             </a:r>
             <a:endParaRPr lang="ru-RU" dirty="0"/>
           </a:p>
@@ -4304,7 +4075,7 @@
         </p:nvSpPr>
         <p:spPr>
           <a:xfrm>
-            <a:off x="0" y="2500306"/>
+            <a:off x="1357290" y="3214686"/>
             <a:ext cx="1571636" cy="1357322"/>
           </a:xfrm>
           <a:prstGeom prst="rect">
@@ -4334,7 +4105,7 @@
             <a:pPr algn="ctr"/>
             <a:r>
               <a:rPr lang="en-US" dirty="0" smtClean="0"/>
-              <a:t>Remote proxy</a:t>
+              <a:t>Remote client</a:t>
             </a:r>
           </a:p>
           <a:p>
@@ -4346,6 +4117,431 @@
           </a:p>
         </p:txBody>
       </p:sp>
+      <p:sp>
+        <p:nvSpPr>
+          <p:cNvPr id="6" name="Прямоугольник 5"/>
+          <p:cNvSpPr/>
+          <p:nvPr/>
+        </p:nvSpPr>
+        <p:spPr>
+          <a:xfrm>
+            <a:off x="3786182" y="3500438"/>
+            <a:ext cx="1071570" cy="642942"/>
+          </a:xfrm>
+          <a:prstGeom prst="rect">
+            <a:avLst/>
+          </a:prstGeom>
+        </p:spPr>
+        <p:style>
+          <a:lnRef idx="2">
+            <a:schemeClr val="accent1">
+              <a:shade val="50000"/>
+            </a:schemeClr>
+          </a:lnRef>
+          <a:fillRef idx="1">
+            <a:schemeClr val="accent1"/>
+          </a:fillRef>
+          <a:effectRef idx="0">
+            <a:schemeClr val="accent1"/>
+          </a:effectRef>
+          <a:fontRef idx="minor">
+            <a:schemeClr val="lt1"/>
+          </a:fontRef>
+        </p:style>
+        <p:txBody>
+          <a:bodyPr rtlCol="0" anchor="ctr"/>
+          <a:lstStyle/>
+          <a:p>
+            <a:pPr algn="ctr"/>
+            <a:r>
+              <a:rPr lang="en-US" dirty="0" smtClean="0"/>
+              <a:t>Security</a:t>
+            </a:r>
+          </a:p>
+          <a:p>
+            <a:pPr algn="ctr"/>
+            <a:endParaRPr lang="ru-RU" dirty="0"/>
+          </a:p>
+        </p:txBody>
+      </p:sp>
+      <p:sp>
+        <p:nvSpPr>
+          <p:cNvPr id="7" name="Прямоугольник 6"/>
+          <p:cNvSpPr/>
+          <p:nvPr/>
+        </p:nvSpPr>
+        <p:spPr>
+          <a:xfrm>
+            <a:off x="3857620" y="2357430"/>
+            <a:ext cx="1071570" cy="642942"/>
+          </a:xfrm>
+          <a:prstGeom prst="rect">
+            <a:avLst/>
+          </a:prstGeom>
+        </p:spPr>
+        <p:style>
+          <a:lnRef idx="2">
+            <a:schemeClr val="accent1">
+              <a:shade val="50000"/>
+            </a:schemeClr>
+          </a:lnRef>
+          <a:fillRef idx="1">
+            <a:schemeClr val="accent1"/>
+          </a:fillRef>
+          <a:effectRef idx="0">
+            <a:schemeClr val="accent1"/>
+          </a:effectRef>
+          <a:fontRef idx="minor">
+            <a:schemeClr val="lt1"/>
+          </a:fontRef>
+        </p:style>
+        <p:txBody>
+          <a:bodyPr rtlCol="0" anchor="ctr"/>
+          <a:lstStyle/>
+          <a:p>
+            <a:pPr algn="ctr"/>
+            <a:r>
+              <a:rPr lang="en-US" dirty="0" smtClean="0"/>
+              <a:t>Encoding</a:t>
+            </a:r>
+          </a:p>
+          <a:p>
+            <a:pPr algn="ctr"/>
+            <a:r>
+              <a:rPr lang="en-US" dirty="0" smtClean="0"/>
+              <a:t>(in)</a:t>
+            </a:r>
+            <a:endParaRPr lang="ru-RU" dirty="0"/>
+          </a:p>
+        </p:txBody>
+      </p:sp>
+      <p:cxnSp>
+        <p:nvCxnSpPr>
+          <p:cNvPr id="9" name="Прямая со стрелкой 8"/>
+          <p:cNvCxnSpPr>
+            <a:stCxn id="7" idx="2"/>
+            <a:endCxn id="6" idx="0"/>
+          </p:cNvCxnSpPr>
+          <p:nvPr/>
+        </p:nvCxnSpPr>
+        <p:spPr>
+          <a:xfrm rot="5400000">
+            <a:off x="4107653" y="3214686"/>
+            <a:ext cx="500066" cy="71438"/>
+          </a:xfrm>
+          <a:prstGeom prst="bentConnector3">
+            <a:avLst>
+              <a:gd name="adj1" fmla="val 50000"/>
+            </a:avLst>
+          </a:prstGeom>
+          <a:ln>
+            <a:solidFill>
+              <a:srgbClr val="FF0000"/>
+            </a:solidFill>
+            <a:tailEnd type="arrow"/>
+          </a:ln>
+        </p:spPr>
+        <p:style>
+          <a:lnRef idx="1">
+            <a:schemeClr val="accent1"/>
+          </a:lnRef>
+          <a:fillRef idx="0">
+            <a:schemeClr val="accent1"/>
+          </a:fillRef>
+          <a:effectRef idx="0">
+            <a:schemeClr val="accent1"/>
+          </a:effectRef>
+          <a:fontRef idx="minor">
+            <a:schemeClr val="tx1"/>
+          </a:fontRef>
+        </p:style>
+      </p:cxnSp>
+      <p:cxnSp>
+        <p:nvCxnSpPr>
+          <p:cNvPr id="11" name="Прямая со стрелкой 10"/>
+          <p:cNvCxnSpPr>
+            <a:stCxn id="40" idx="1"/>
+            <a:endCxn id="4" idx="2"/>
+          </p:cNvCxnSpPr>
+          <p:nvPr/>
+        </p:nvCxnSpPr>
+        <p:spPr>
+          <a:xfrm rot="10800000">
+            <a:off x="2143108" y="4572009"/>
+            <a:ext cx="1714512" cy="464347"/>
+          </a:xfrm>
+          <a:prstGeom prst="bentConnector2">
+            <a:avLst/>
+          </a:prstGeom>
+          <a:ln>
+            <a:solidFill>
+              <a:srgbClr val="FF0000"/>
+            </a:solidFill>
+            <a:tailEnd type="arrow"/>
+          </a:ln>
+        </p:spPr>
+        <p:style>
+          <a:lnRef idx="1">
+            <a:schemeClr val="accent1"/>
+          </a:lnRef>
+          <a:fillRef idx="0">
+            <a:schemeClr val="accent1"/>
+          </a:fillRef>
+          <a:effectRef idx="0">
+            <a:schemeClr val="accent1"/>
+          </a:effectRef>
+          <a:fontRef idx="minor">
+            <a:schemeClr val="tx1"/>
+          </a:fontRef>
+        </p:style>
+      </p:cxnSp>
+      <p:cxnSp>
+        <p:nvCxnSpPr>
+          <p:cNvPr id="12" name="Прямая со стрелкой 11"/>
+          <p:cNvCxnSpPr>
+            <a:stCxn id="6" idx="3"/>
+            <a:endCxn id="26" idx="1"/>
+          </p:cNvCxnSpPr>
+          <p:nvPr/>
+        </p:nvCxnSpPr>
+        <p:spPr>
+          <a:xfrm>
+            <a:off x="4857752" y="3821909"/>
+            <a:ext cx="714380" cy="214314"/>
+          </a:xfrm>
+          <a:prstGeom prst="bentConnector3">
+            <a:avLst>
+              <a:gd name="adj1" fmla="val 50000"/>
+            </a:avLst>
+          </a:prstGeom>
+          <a:ln>
+            <a:solidFill>
+              <a:srgbClr val="FF0000"/>
+            </a:solidFill>
+            <a:tailEnd type="arrow"/>
+          </a:ln>
+        </p:spPr>
+        <p:style>
+          <a:lnRef idx="1">
+            <a:schemeClr val="accent1"/>
+          </a:lnRef>
+          <a:fillRef idx="0">
+            <a:schemeClr val="accent1"/>
+          </a:fillRef>
+          <a:effectRef idx="0">
+            <a:schemeClr val="accent1"/>
+          </a:effectRef>
+          <a:fontRef idx="minor">
+            <a:schemeClr val="tx1"/>
+          </a:fontRef>
+        </p:style>
+      </p:cxnSp>
+      <p:cxnSp>
+        <p:nvCxnSpPr>
+          <p:cNvPr id="13" name="Прямая со стрелкой 12"/>
+          <p:cNvCxnSpPr>
+            <a:stCxn id="4" idx="3"/>
+            <a:endCxn id="7" idx="1"/>
+          </p:cNvCxnSpPr>
+          <p:nvPr/>
+        </p:nvCxnSpPr>
+        <p:spPr>
+          <a:xfrm flipV="1">
+            <a:off x="2928926" y="2678901"/>
+            <a:ext cx="928694" cy="1214446"/>
+          </a:xfrm>
+          <a:prstGeom prst="bentConnector3">
+            <a:avLst>
+              <a:gd name="adj1" fmla="val 50000"/>
+            </a:avLst>
+          </a:prstGeom>
+          <a:ln>
+            <a:solidFill>
+              <a:srgbClr val="FF0000"/>
+            </a:solidFill>
+            <a:tailEnd type="arrow"/>
+          </a:ln>
+        </p:spPr>
+        <p:style>
+          <a:lnRef idx="1">
+            <a:schemeClr val="accent1"/>
+          </a:lnRef>
+          <a:fillRef idx="0">
+            <a:schemeClr val="accent1"/>
+          </a:fillRef>
+          <a:effectRef idx="0">
+            <a:schemeClr val="accent1"/>
+          </a:effectRef>
+          <a:fontRef idx="minor">
+            <a:schemeClr val="tx1"/>
+          </a:fontRef>
+        </p:style>
+      </p:cxnSp>
+      <p:sp>
+        <p:nvSpPr>
+          <p:cNvPr id="26" name="Прямоугольник 25"/>
+          <p:cNvSpPr/>
+          <p:nvPr/>
+        </p:nvSpPr>
+        <p:spPr>
+          <a:xfrm>
+            <a:off x="5572132" y="3357562"/>
+            <a:ext cx="1571636" cy="1357322"/>
+          </a:xfrm>
+          <a:prstGeom prst="rect">
+            <a:avLst/>
+          </a:prstGeom>
+        </p:spPr>
+        <p:style>
+          <a:lnRef idx="2">
+            <a:schemeClr val="accent1">
+              <a:shade val="50000"/>
+            </a:schemeClr>
+          </a:lnRef>
+          <a:fillRef idx="1">
+            <a:schemeClr val="accent1"/>
+          </a:fillRef>
+          <a:effectRef idx="0">
+            <a:schemeClr val="accent1"/>
+          </a:effectRef>
+          <a:fontRef idx="minor">
+            <a:schemeClr val="lt1"/>
+          </a:fontRef>
+        </p:style>
+        <p:txBody>
+          <a:bodyPr rtlCol="0" anchor="ctr"/>
+          <a:lstStyle/>
+          <a:p>
+            <a:pPr algn="ctr"/>
+            <a:r>
+              <a:rPr lang="en-US" dirty="0" smtClean="0"/>
+              <a:t>Remote database</a:t>
+            </a:r>
+          </a:p>
+          <a:p>
+            <a:pPr algn="ctr"/>
+            <a:r>
+              <a:rPr lang="en-US" dirty="0" smtClean="0"/>
+              <a:t>(receive-send)</a:t>
+            </a:r>
+          </a:p>
+        </p:txBody>
+      </p:sp>
+      <p:cxnSp>
+        <p:nvCxnSpPr>
+          <p:cNvPr id="10" name="Прямая со стрелкой 9"/>
+          <p:cNvCxnSpPr>
+            <a:stCxn id="26" idx="2"/>
+            <a:endCxn id="40" idx="3"/>
+          </p:cNvCxnSpPr>
+          <p:nvPr/>
+        </p:nvCxnSpPr>
+        <p:spPr>
+          <a:xfrm rot="5400000">
+            <a:off x="5482835" y="4161239"/>
+            <a:ext cx="321471" cy="1428760"/>
+          </a:xfrm>
+          <a:prstGeom prst="bentConnector2">
+            <a:avLst/>
+          </a:prstGeom>
+          <a:ln>
+            <a:solidFill>
+              <a:srgbClr val="FF0000"/>
+            </a:solidFill>
+            <a:tailEnd type="arrow"/>
+          </a:ln>
+        </p:spPr>
+        <p:style>
+          <a:lnRef idx="1">
+            <a:schemeClr val="accent1"/>
+          </a:lnRef>
+          <a:fillRef idx="0">
+            <a:schemeClr val="accent1"/>
+          </a:fillRef>
+          <a:effectRef idx="0">
+            <a:schemeClr val="accent1"/>
+          </a:effectRef>
+          <a:fontRef idx="minor">
+            <a:schemeClr val="tx1"/>
+          </a:fontRef>
+        </p:style>
+      </p:cxnSp>
+      <p:sp>
+        <p:nvSpPr>
+          <p:cNvPr id="40" name="Прямоугольник 39"/>
+          <p:cNvSpPr/>
+          <p:nvPr/>
+        </p:nvSpPr>
+        <p:spPr>
+          <a:xfrm>
+            <a:off x="3857620" y="4714884"/>
+            <a:ext cx="1071570" cy="642942"/>
+          </a:xfrm>
+          <a:prstGeom prst="rect">
+            <a:avLst/>
+          </a:prstGeom>
+        </p:spPr>
+        <p:style>
+          <a:lnRef idx="2">
+            <a:schemeClr val="accent1">
+              <a:shade val="50000"/>
+            </a:schemeClr>
+          </a:lnRef>
+          <a:fillRef idx="1">
+            <a:schemeClr val="accent1"/>
+          </a:fillRef>
+          <a:effectRef idx="0">
+            <a:schemeClr val="accent1"/>
+          </a:effectRef>
+          <a:fontRef idx="minor">
+            <a:schemeClr val="lt1"/>
+          </a:fontRef>
+        </p:style>
+        <p:txBody>
+          <a:bodyPr rtlCol="0" anchor="ctr"/>
+          <a:lstStyle/>
+          <a:p>
+            <a:pPr algn="ctr"/>
+            <a:r>
+              <a:rPr lang="en-US" dirty="0" smtClean="0"/>
+              <a:t>Encoding</a:t>
+            </a:r>
+          </a:p>
+          <a:p>
+            <a:pPr algn="ctr"/>
+            <a:r>
+              <a:rPr lang="en-US" dirty="0" smtClean="0"/>
+              <a:t>(out)</a:t>
+            </a:r>
+            <a:endParaRPr lang="ru-RU" dirty="0"/>
+          </a:p>
+        </p:txBody>
+      </p:sp>
+    </p:spTree>
+  </p:cSld>
+  <p:clrMapOvr>
+    <a:masterClrMapping/>
+  </p:clrMapOvr>
+</p:sld>
+</file>
+
+<file path=ppt/slides/slide4.xml><?xml version="1.0" encoding="utf-8"?>
+<p:sld xmlns:a="http://schemas.openxmlformats.org/drawingml/2006/main" xmlns:r="http://schemas.openxmlformats.org/officeDocument/2006/relationships" xmlns:p="http://schemas.openxmlformats.org/presentationml/2006/main">
+  <p:cSld>
+    <p:spTree>
+      <p:nvGrpSpPr>
+        <p:cNvPr id="1" name=""/>
+        <p:cNvGrpSpPr/>
+        <p:nvPr/>
+      </p:nvGrpSpPr>
+      <p:grpSpPr>
+        <a:xfrm>
+          <a:off x="0" y="0"/>
+          <a:ext cx="0" cy="0"/>
+          <a:chOff x="0" y="0"/>
+          <a:chExt cx="0" cy="0"/>
+        </a:xfrm>
+      </p:grpSpPr>
       <p:sp>
         <p:nvSpPr>
           <p:cNvPr id="5" name="Прямоугольник 4"/>
@@ -4354,7 +4550,7 @@
         </p:nvSpPr>
         <p:spPr>
           <a:xfrm>
-            <a:off x="3500430" y="1785926"/>
+            <a:off x="1643042" y="1500174"/>
             <a:ext cx="5500726" cy="4643470"/>
           </a:xfrm>
           <a:prstGeom prst="rect">
@@ -4455,13 +4651,86 @@
       </p:sp>
       <p:sp>
         <p:nvSpPr>
+          <p:cNvPr id="2" name="Заголовок 1"/>
+          <p:cNvSpPr>
+            <a:spLocks noGrp="1"/>
+          </p:cNvSpPr>
+          <p:nvPr>
+            <p:ph type="title"/>
+          </p:nvPr>
+        </p:nvSpPr>
+        <p:spPr/>
+        <p:txBody>
+          <a:bodyPr/>
+          <a:lstStyle/>
+          <a:p>
+            <a:r>
+              <a:rPr lang="en-US" dirty="0" smtClean="0"/>
+              <a:t>Database</a:t>
+            </a:r>
+            <a:endParaRPr lang="ru-RU" dirty="0"/>
+          </a:p>
+        </p:txBody>
+      </p:sp>
+      <p:sp>
+        <p:nvSpPr>
+          <p:cNvPr id="4" name="Прямоугольник 3"/>
+          <p:cNvSpPr/>
+          <p:nvPr/>
+        </p:nvSpPr>
+        <p:spPr>
+          <a:xfrm>
+            <a:off x="2214546" y="2571744"/>
+            <a:ext cx="1571636" cy="1357322"/>
+          </a:xfrm>
+          <a:prstGeom prst="rect">
+            <a:avLst/>
+          </a:prstGeom>
+        </p:spPr>
+        <p:style>
+          <a:lnRef idx="2">
+            <a:schemeClr val="accent1">
+              <a:shade val="50000"/>
+            </a:schemeClr>
+          </a:lnRef>
+          <a:fillRef idx="1">
+            <a:schemeClr val="accent1"/>
+          </a:fillRef>
+          <a:effectRef idx="0">
+            <a:schemeClr val="accent1"/>
+          </a:effectRef>
+          <a:fontRef idx="minor">
+            <a:schemeClr val="lt1"/>
+          </a:fontRef>
+        </p:style>
+        <p:txBody>
+          <a:bodyPr rtlCol="0" anchor="ctr"/>
+          <a:lstStyle/>
+          <a:p>
+            <a:pPr algn="ctr"/>
+            <a:r>
+              <a:rPr lang="en-US" dirty="0" smtClean="0"/>
+              <a:t>Remote proxy</a:t>
+            </a:r>
+          </a:p>
+          <a:p>
+            <a:pPr algn="ctr"/>
+            <a:r>
+              <a:rPr lang="en-US" dirty="0" smtClean="0"/>
+              <a:t>(receive-send)</a:t>
+            </a:r>
+          </a:p>
+        </p:txBody>
+      </p:sp>
+      <p:sp>
+        <p:nvSpPr>
           <p:cNvPr id="8" name="Прямоугольник 7"/>
           <p:cNvSpPr/>
           <p:nvPr/>
         </p:nvSpPr>
         <p:spPr>
           <a:xfrm>
-            <a:off x="5429256" y="3857628"/>
+            <a:off x="5572132" y="4071942"/>
             <a:ext cx="1357322" cy="785818"/>
           </a:xfrm>
           <a:prstGeom prst="rect">
@@ -4491,7 +4760,7 @@
             <a:pPr algn="ctr"/>
             <a:r>
               <a:rPr lang="en-US" dirty="0" smtClean="0"/>
-              <a:t>Database</a:t>
+              <a:t>ServerWork</a:t>
             </a:r>
           </a:p>
           <a:p>
@@ -4515,8 +4784,8 @@
         </p:nvCxnSpPr>
         <p:spPr>
           <a:xfrm rot="10800000">
-            <a:off x="785818" y="3857629"/>
-            <a:ext cx="4643438" cy="392909"/>
+            <a:off x="3000364" y="3929067"/>
+            <a:ext cx="2571768" cy="535785"/>
           </a:xfrm>
           <a:prstGeom prst="bentConnector2">
             <a:avLst/>
@@ -4554,8 +4823,8 @@
         </p:nvCxnSpPr>
         <p:spPr>
           <a:xfrm>
-            <a:off x="1571636" y="3178967"/>
-            <a:ext cx="4536281" cy="678661"/>
+            <a:off x="3786182" y="3250405"/>
+            <a:ext cx="2464611" cy="821537"/>
           </a:xfrm>
           <a:prstGeom prst="bentConnector2">
             <a:avLst/>

</xml_diff>

<commit_message>
Adding abstract classes of Client
</commit_message>
<xml_diff>
--- a/Structure of project.pptx
+++ b/Structure of project.pptx
@@ -107,6 +107,22 @@
       </a:defRPr>
     </a:lvl9pPr>
   </p:defaultTextStyle>
+  <p:extLst>
+    <p:ext uri="{EFAFB233-063F-42B5-8137-9DF3F51BA10A}">
+      <p15:sldGuideLst xmlns:p15="http://schemas.microsoft.com/office/powerpoint/2012/main">
+        <p15:guide id="1" orient="horz" pos="2160">
+          <p15:clr>
+            <a:srgbClr val="A4A3A4"/>
+          </p15:clr>
+        </p15:guide>
+        <p15:guide id="2" pos="2880">
+          <p15:clr>
+            <a:srgbClr val="A4A3A4"/>
+          </p15:clr>
+        </p15:guide>
+      </p15:sldGuideLst>
+    </p:ext>
+  </p:extLst>
 </p:presentation>
 </file>
 
@@ -292,7 +308,7 @@
             <a:fld id="{5B106E36-FD25-4E2D-B0AA-010F637433A0}" type="datetimeFigureOut">
               <a:rPr lang="ru-RU" smtClean="0"/>
               <a:pPr/>
-              <a:t>14.06.2020</a:t>
+              <a:t>20.06.2020</a:t>
             </a:fld>
             <a:endParaRPr lang="ru-RU" dirty="0"/>
           </a:p>
@@ -459,7 +475,7 @@
             <a:fld id="{5B106E36-FD25-4E2D-B0AA-010F637433A0}" type="datetimeFigureOut">
               <a:rPr lang="ru-RU" smtClean="0"/>
               <a:pPr/>
-              <a:t>14.06.2020</a:t>
+              <a:t>20.06.2020</a:t>
             </a:fld>
             <a:endParaRPr lang="ru-RU" dirty="0"/>
           </a:p>
@@ -636,7 +652,7 @@
             <a:fld id="{5B106E36-FD25-4E2D-B0AA-010F637433A0}" type="datetimeFigureOut">
               <a:rPr lang="ru-RU" smtClean="0"/>
               <a:pPr/>
-              <a:t>14.06.2020</a:t>
+              <a:t>20.06.2020</a:t>
             </a:fld>
             <a:endParaRPr lang="ru-RU" dirty="0"/>
           </a:p>
@@ -803,7 +819,7 @@
             <a:fld id="{5B106E36-FD25-4E2D-B0AA-010F637433A0}" type="datetimeFigureOut">
               <a:rPr lang="ru-RU" smtClean="0"/>
               <a:pPr/>
-              <a:t>14.06.2020</a:t>
+              <a:t>20.06.2020</a:t>
             </a:fld>
             <a:endParaRPr lang="ru-RU" dirty="0"/>
           </a:p>
@@ -1046,7 +1062,7 @@
             <a:fld id="{5B106E36-FD25-4E2D-B0AA-010F637433A0}" type="datetimeFigureOut">
               <a:rPr lang="ru-RU" smtClean="0"/>
               <a:pPr/>
-              <a:t>14.06.2020</a:t>
+              <a:t>20.06.2020</a:t>
             </a:fld>
             <a:endParaRPr lang="ru-RU" dirty="0"/>
           </a:p>
@@ -1331,7 +1347,7 @@
             <a:fld id="{5B106E36-FD25-4E2D-B0AA-010F637433A0}" type="datetimeFigureOut">
               <a:rPr lang="ru-RU" smtClean="0"/>
               <a:pPr/>
-              <a:t>14.06.2020</a:t>
+              <a:t>20.06.2020</a:t>
             </a:fld>
             <a:endParaRPr lang="ru-RU" dirty="0"/>
           </a:p>
@@ -1750,7 +1766,7 @@
             <a:fld id="{5B106E36-FD25-4E2D-B0AA-010F637433A0}" type="datetimeFigureOut">
               <a:rPr lang="ru-RU" smtClean="0"/>
               <a:pPr/>
-              <a:t>14.06.2020</a:t>
+              <a:t>20.06.2020</a:t>
             </a:fld>
             <a:endParaRPr lang="ru-RU" dirty="0"/>
           </a:p>
@@ -1865,7 +1881,7 @@
             <a:fld id="{5B106E36-FD25-4E2D-B0AA-010F637433A0}" type="datetimeFigureOut">
               <a:rPr lang="ru-RU" smtClean="0"/>
               <a:pPr/>
-              <a:t>14.06.2020</a:t>
+              <a:t>20.06.2020</a:t>
             </a:fld>
             <a:endParaRPr lang="ru-RU" dirty="0"/>
           </a:p>
@@ -1957,7 +1973,7 @@
             <a:fld id="{5B106E36-FD25-4E2D-B0AA-010F637433A0}" type="datetimeFigureOut">
               <a:rPr lang="ru-RU" smtClean="0"/>
               <a:pPr/>
-              <a:t>14.06.2020</a:t>
+              <a:t>20.06.2020</a:t>
             </a:fld>
             <a:endParaRPr lang="ru-RU" dirty="0"/>
           </a:p>
@@ -2231,7 +2247,7 @@
             <a:fld id="{5B106E36-FD25-4E2D-B0AA-010F637433A0}" type="datetimeFigureOut">
               <a:rPr lang="ru-RU" smtClean="0"/>
               <a:pPr/>
-              <a:t>14.06.2020</a:t>
+              <a:t>20.06.2020</a:t>
             </a:fld>
             <a:endParaRPr lang="ru-RU" dirty="0"/>
           </a:p>
@@ -2481,7 +2497,7 @@
             <a:fld id="{5B106E36-FD25-4E2D-B0AA-010F637433A0}" type="datetimeFigureOut">
               <a:rPr lang="ru-RU" smtClean="0"/>
               <a:pPr/>
-              <a:t>14.06.2020</a:t>
+              <a:t>20.06.2020</a:t>
             </a:fld>
             <a:endParaRPr lang="ru-RU" dirty="0"/>
           </a:p>
@@ -2691,7 +2707,7 @@
             <a:fld id="{5B106E36-FD25-4E2D-B0AA-010F637433A0}" type="datetimeFigureOut">
               <a:rPr lang="ru-RU" smtClean="0"/>
               <a:pPr/>
-              <a:t>14.06.2020</a:t>
+              <a:t>20.06.2020</a:t>
             </a:fld>
             <a:endParaRPr lang="ru-RU" dirty="0"/>
           </a:p>
@@ -4760,15 +4776,8 @@
             <a:pPr algn="ctr"/>
             <a:r>
               <a:rPr lang="en-US" dirty="0" smtClean="0"/>
-              <a:t>ServerWork</a:t>
-            </a:r>
-          </a:p>
-          <a:p>
-            <a:pPr algn="ctr"/>
-            <a:endParaRPr lang="en-US" dirty="0" smtClean="0"/>
-          </a:p>
-          <a:p>
-            <a:pPr algn="ctr"/>
+              <a:t>Database</a:t>
+            </a:r>
             <a:endParaRPr lang="ru-RU" dirty="0"/>
           </a:p>
         </p:txBody>

</xml_diff>

<commit_message>
Commit to try test run
</commit_message>
<xml_diff>
--- a/Structure of project.pptx
+++ b/Structure of project.pptx
@@ -308,7 +308,7 @@
             <a:fld id="{5B106E36-FD25-4E2D-B0AA-010F637433A0}" type="datetimeFigureOut">
               <a:rPr lang="ru-RU" smtClean="0"/>
               <a:pPr/>
-              <a:t>20.06.2020</a:t>
+              <a:t>21.06.2020</a:t>
             </a:fld>
             <a:endParaRPr lang="ru-RU" dirty="0"/>
           </a:p>
@@ -475,7 +475,7 @@
             <a:fld id="{5B106E36-FD25-4E2D-B0AA-010F637433A0}" type="datetimeFigureOut">
               <a:rPr lang="ru-RU" smtClean="0"/>
               <a:pPr/>
-              <a:t>20.06.2020</a:t>
+              <a:t>21.06.2020</a:t>
             </a:fld>
             <a:endParaRPr lang="ru-RU" dirty="0"/>
           </a:p>
@@ -652,7 +652,7 @@
             <a:fld id="{5B106E36-FD25-4E2D-B0AA-010F637433A0}" type="datetimeFigureOut">
               <a:rPr lang="ru-RU" smtClean="0"/>
               <a:pPr/>
-              <a:t>20.06.2020</a:t>
+              <a:t>21.06.2020</a:t>
             </a:fld>
             <a:endParaRPr lang="ru-RU" dirty="0"/>
           </a:p>
@@ -819,7 +819,7 @@
             <a:fld id="{5B106E36-FD25-4E2D-B0AA-010F637433A0}" type="datetimeFigureOut">
               <a:rPr lang="ru-RU" smtClean="0"/>
               <a:pPr/>
-              <a:t>20.06.2020</a:t>
+              <a:t>21.06.2020</a:t>
             </a:fld>
             <a:endParaRPr lang="ru-RU" dirty="0"/>
           </a:p>
@@ -1062,7 +1062,7 @@
             <a:fld id="{5B106E36-FD25-4E2D-B0AA-010F637433A0}" type="datetimeFigureOut">
               <a:rPr lang="ru-RU" smtClean="0"/>
               <a:pPr/>
-              <a:t>20.06.2020</a:t>
+              <a:t>21.06.2020</a:t>
             </a:fld>
             <a:endParaRPr lang="ru-RU" dirty="0"/>
           </a:p>
@@ -1347,7 +1347,7 @@
             <a:fld id="{5B106E36-FD25-4E2D-B0AA-010F637433A0}" type="datetimeFigureOut">
               <a:rPr lang="ru-RU" smtClean="0"/>
               <a:pPr/>
-              <a:t>20.06.2020</a:t>
+              <a:t>21.06.2020</a:t>
             </a:fld>
             <a:endParaRPr lang="ru-RU" dirty="0"/>
           </a:p>
@@ -1766,7 +1766,7 @@
             <a:fld id="{5B106E36-FD25-4E2D-B0AA-010F637433A0}" type="datetimeFigureOut">
               <a:rPr lang="ru-RU" smtClean="0"/>
               <a:pPr/>
-              <a:t>20.06.2020</a:t>
+              <a:t>21.06.2020</a:t>
             </a:fld>
             <a:endParaRPr lang="ru-RU" dirty="0"/>
           </a:p>
@@ -1881,7 +1881,7 @@
             <a:fld id="{5B106E36-FD25-4E2D-B0AA-010F637433A0}" type="datetimeFigureOut">
               <a:rPr lang="ru-RU" smtClean="0"/>
               <a:pPr/>
-              <a:t>20.06.2020</a:t>
+              <a:t>21.06.2020</a:t>
             </a:fld>
             <a:endParaRPr lang="ru-RU" dirty="0"/>
           </a:p>
@@ -1973,7 +1973,7 @@
             <a:fld id="{5B106E36-FD25-4E2D-B0AA-010F637433A0}" type="datetimeFigureOut">
               <a:rPr lang="ru-RU" smtClean="0"/>
               <a:pPr/>
-              <a:t>20.06.2020</a:t>
+              <a:t>21.06.2020</a:t>
             </a:fld>
             <a:endParaRPr lang="ru-RU" dirty="0"/>
           </a:p>
@@ -2247,7 +2247,7 @@
             <a:fld id="{5B106E36-FD25-4E2D-B0AA-010F637433A0}" type="datetimeFigureOut">
               <a:rPr lang="ru-RU" smtClean="0"/>
               <a:pPr/>
-              <a:t>20.06.2020</a:t>
+              <a:t>21.06.2020</a:t>
             </a:fld>
             <a:endParaRPr lang="ru-RU" dirty="0"/>
           </a:p>
@@ -2497,7 +2497,7 @@
             <a:fld id="{5B106E36-FD25-4E2D-B0AA-010F637433A0}" type="datetimeFigureOut">
               <a:rPr lang="ru-RU" smtClean="0"/>
               <a:pPr/>
-              <a:t>20.06.2020</a:t>
+              <a:t>21.06.2020</a:t>
             </a:fld>
             <a:endParaRPr lang="ru-RU" dirty="0"/>
           </a:p>
@@ -2707,7 +2707,7 @@
             <a:fld id="{5B106E36-FD25-4E2D-B0AA-010F637433A0}" type="datetimeFigureOut">
               <a:rPr lang="ru-RU" smtClean="0"/>
               <a:pPr/>
-              <a:t>20.06.2020</a:t>
+              <a:t>21.06.2020</a:t>
             </a:fld>
             <a:endParaRPr lang="ru-RU" dirty="0"/>
           </a:p>
@@ -3288,7 +3288,7 @@
         <p:spPr>
           <a:xfrm>
             <a:off x="5572132" y="3714752"/>
-            <a:ext cx="1714512" cy="785818"/>
+            <a:ext cx="1714512" cy="1000132"/>
           </a:xfrm>
           <a:prstGeom prst="rect">
             <a:avLst/>
@@ -3635,6 +3635,50 @@
           </a:fontRef>
         </p:style>
       </p:cxnSp>
+      <p:sp>
+        <p:nvSpPr>
+          <p:cNvPr id="13" name="Прямоугольник 12"/>
+          <p:cNvSpPr/>
+          <p:nvPr/>
+        </p:nvSpPr>
+        <p:spPr>
+          <a:xfrm>
+            <a:off x="6036479" y="4166220"/>
+            <a:ext cx="1050155" cy="440871"/>
+          </a:xfrm>
+          <a:prstGeom prst="rect">
+            <a:avLst/>
+          </a:prstGeom>
+        </p:spPr>
+        <p:style>
+          <a:lnRef idx="2">
+            <a:schemeClr val="accent1">
+              <a:shade val="50000"/>
+            </a:schemeClr>
+          </a:lnRef>
+          <a:fillRef idx="1">
+            <a:schemeClr val="accent1"/>
+          </a:fillRef>
+          <a:effectRef idx="0">
+            <a:schemeClr val="accent1"/>
+          </a:effectRef>
+          <a:fontRef idx="minor">
+            <a:schemeClr val="lt1"/>
+          </a:fontRef>
+        </p:style>
+        <p:txBody>
+          <a:bodyPr rtlCol="0" anchor="ctr"/>
+          <a:lstStyle/>
+          <a:p>
+            <a:pPr algn="ctr"/>
+            <a:r>
+              <a:rPr lang="en-US" dirty="0" smtClean="0"/>
+              <a:t>Work</a:t>
+            </a:r>
+            <a:endParaRPr lang="ru-RU" dirty="0"/>
+          </a:p>
+        </p:txBody>
+      </p:sp>
     </p:spTree>
   </p:cSld>
   <p:clrMapOvr>
@@ -3880,7 +3924,11 @@
             </a:pPr>
             <a:r>
               <a:rPr lang="en-US" dirty="0" err="1" smtClean="0"/>
-              <a:t>GetWorkCode</a:t>
+              <a:t>GetWorkC</a:t>
+            </a:r>
+            <a:r>
+              <a:rPr lang="en-US" dirty="0" err="1" smtClean="0"/>
+              <a:t>lass</a:t>
             </a:r>
             <a:r>
               <a:rPr lang="en-US" dirty="0" smtClean="0"/>
@@ -3902,7 +3950,7 @@
             </a:pPr>
             <a:r>
               <a:rPr lang="en-US" dirty="0" err="1" smtClean="0"/>
-              <a:t>ReceiveWorkCode</a:t>
+              <a:t>ReceiveWorkClass</a:t>
             </a:r>
             <a:r>
               <a:rPr lang="en-US" dirty="0" smtClean="0"/>
@@ -3918,7 +3966,7 @@
             </a:r>
             <a:r>
               <a:rPr lang="en-US" dirty="0" err="1" smtClean="0"/>
-              <a:t>WorkCode</a:t>
+              <a:t>WorkClass</a:t>
             </a:r>
             <a:r>
               <a:rPr lang="en-US" dirty="0" smtClean="0"/>

</xml_diff>

<commit_message>
Structure changing: new protocol, Security class deleted
</commit_message>
<xml_diff>
--- a/Structure of project.pptx
+++ b/Structure of project.pptx
@@ -308,7 +308,7 @@
             <a:fld id="{5B106E36-FD25-4E2D-B0AA-010F637433A0}" type="datetimeFigureOut">
               <a:rPr lang="ru-RU" smtClean="0"/>
               <a:pPr/>
-              <a:t>21.06.2020</a:t>
+              <a:t>01.07.2020</a:t>
             </a:fld>
             <a:endParaRPr lang="ru-RU" dirty="0"/>
           </a:p>
@@ -475,7 +475,7 @@
             <a:fld id="{5B106E36-FD25-4E2D-B0AA-010F637433A0}" type="datetimeFigureOut">
               <a:rPr lang="ru-RU" smtClean="0"/>
               <a:pPr/>
-              <a:t>21.06.2020</a:t>
+              <a:t>01.07.2020</a:t>
             </a:fld>
             <a:endParaRPr lang="ru-RU" dirty="0"/>
           </a:p>
@@ -652,7 +652,7 @@
             <a:fld id="{5B106E36-FD25-4E2D-B0AA-010F637433A0}" type="datetimeFigureOut">
               <a:rPr lang="ru-RU" smtClean="0"/>
               <a:pPr/>
-              <a:t>21.06.2020</a:t>
+              <a:t>01.07.2020</a:t>
             </a:fld>
             <a:endParaRPr lang="ru-RU" dirty="0"/>
           </a:p>
@@ -819,7 +819,7 @@
             <a:fld id="{5B106E36-FD25-4E2D-B0AA-010F637433A0}" type="datetimeFigureOut">
               <a:rPr lang="ru-RU" smtClean="0"/>
               <a:pPr/>
-              <a:t>21.06.2020</a:t>
+              <a:t>01.07.2020</a:t>
             </a:fld>
             <a:endParaRPr lang="ru-RU" dirty="0"/>
           </a:p>
@@ -1062,7 +1062,7 @@
             <a:fld id="{5B106E36-FD25-4E2D-B0AA-010F637433A0}" type="datetimeFigureOut">
               <a:rPr lang="ru-RU" smtClean="0"/>
               <a:pPr/>
-              <a:t>21.06.2020</a:t>
+              <a:t>01.07.2020</a:t>
             </a:fld>
             <a:endParaRPr lang="ru-RU" dirty="0"/>
           </a:p>
@@ -1347,7 +1347,7 @@
             <a:fld id="{5B106E36-FD25-4E2D-B0AA-010F637433A0}" type="datetimeFigureOut">
               <a:rPr lang="ru-RU" smtClean="0"/>
               <a:pPr/>
-              <a:t>21.06.2020</a:t>
+              <a:t>01.07.2020</a:t>
             </a:fld>
             <a:endParaRPr lang="ru-RU" dirty="0"/>
           </a:p>
@@ -1766,7 +1766,7 @@
             <a:fld id="{5B106E36-FD25-4E2D-B0AA-010F637433A0}" type="datetimeFigureOut">
               <a:rPr lang="ru-RU" smtClean="0"/>
               <a:pPr/>
-              <a:t>21.06.2020</a:t>
+              <a:t>01.07.2020</a:t>
             </a:fld>
             <a:endParaRPr lang="ru-RU" dirty="0"/>
           </a:p>
@@ -1881,7 +1881,7 @@
             <a:fld id="{5B106E36-FD25-4E2D-B0AA-010F637433A0}" type="datetimeFigureOut">
               <a:rPr lang="ru-RU" smtClean="0"/>
               <a:pPr/>
-              <a:t>21.06.2020</a:t>
+              <a:t>01.07.2020</a:t>
             </a:fld>
             <a:endParaRPr lang="ru-RU" dirty="0"/>
           </a:p>
@@ -1973,7 +1973,7 @@
             <a:fld id="{5B106E36-FD25-4E2D-B0AA-010F637433A0}" type="datetimeFigureOut">
               <a:rPr lang="ru-RU" smtClean="0"/>
               <a:pPr/>
-              <a:t>21.06.2020</a:t>
+              <a:t>01.07.2020</a:t>
             </a:fld>
             <a:endParaRPr lang="ru-RU" dirty="0"/>
           </a:p>
@@ -2247,7 +2247,7 @@
             <a:fld id="{5B106E36-FD25-4E2D-B0AA-010F637433A0}" type="datetimeFigureOut">
               <a:rPr lang="ru-RU" smtClean="0"/>
               <a:pPr/>
-              <a:t>21.06.2020</a:t>
+              <a:t>01.07.2020</a:t>
             </a:fld>
             <a:endParaRPr lang="ru-RU" dirty="0"/>
           </a:p>
@@ -2497,7 +2497,7 @@
             <a:fld id="{5B106E36-FD25-4E2D-B0AA-010F637433A0}" type="datetimeFigureOut">
               <a:rPr lang="ru-RU" smtClean="0"/>
               <a:pPr/>
-              <a:t>21.06.2020</a:t>
+              <a:t>01.07.2020</a:t>
             </a:fld>
             <a:endParaRPr lang="ru-RU" dirty="0"/>
           </a:p>
@@ -2707,7 +2707,7 @@
             <a:fld id="{5B106E36-FD25-4E2D-B0AA-010F637433A0}" type="datetimeFigureOut">
               <a:rPr lang="ru-RU" smtClean="0"/>
               <a:pPr/>
-              <a:t>21.06.2020</a:t>
+              <a:t>01.07.2020</a:t>
             </a:fld>
             <a:endParaRPr lang="ru-RU" dirty="0"/>
           </a:p>
@@ -3186,7 +3186,7 @@
         <p:spPr>
           <a:xfrm>
             <a:off x="1928794" y="2643182"/>
-            <a:ext cx="3357586" cy="2786082"/>
+            <a:ext cx="3357586" cy="2225978"/>
           </a:xfrm>
           <a:prstGeom prst="rect">
             <a:avLst/>
@@ -3215,15 +3215,12 @@
             <a:pPr algn="ctr"/>
             <a:r>
               <a:rPr lang="en-US" dirty="0" smtClean="0"/>
-              <a:t>Remote proxy</a:t>
-            </a:r>
-          </a:p>
-          <a:p>
-            <a:pPr algn="ctr"/>
-            <a:endParaRPr lang="en-US" dirty="0" smtClean="0"/>
-          </a:p>
-          <a:p>
-            <a:pPr algn="ctr"/>
+              <a:t>Remote </a:t>
+            </a:r>
+            <a:r>
+              <a:rPr lang="en-US" dirty="0" smtClean="0"/>
+              <a:t>proxy</a:t>
+            </a:r>
             <a:endParaRPr lang="en-US" dirty="0" smtClean="0"/>
           </a:p>
           <a:p>
@@ -3333,13 +3330,13 @@
       </p:sp>
       <p:sp>
         <p:nvSpPr>
-          <p:cNvPr id="15" name="Прямоугольник 14"/>
+          <p:cNvPr id="14" name="Прямоугольник 13"/>
           <p:cNvSpPr/>
           <p:nvPr/>
         </p:nvSpPr>
         <p:spPr>
           <a:xfrm>
-            <a:off x="2928926" y="3786190"/>
+            <a:off x="2913147" y="3262715"/>
             <a:ext cx="1357322" cy="571504"/>
           </a:xfrm>
           <a:prstGeom prst="rect">
@@ -3369,22 +3366,22 @@
             <a:pPr algn="ctr"/>
             <a:r>
               <a:rPr lang="en-US" dirty="0" smtClean="0"/>
-              <a:t>Security</a:t>
-            </a:r>
-            <a:endParaRPr lang="ru-RU" dirty="0"/>
-          </a:p>
-        </p:txBody>
-      </p:sp>
-      <p:sp>
-        <p:nvSpPr>
-          <p:cNvPr id="14" name="Прямоугольник 13"/>
+              <a:t>Encoding</a:t>
+            </a:r>
+            <a:endParaRPr lang="ru-RU" dirty="0"/>
+          </a:p>
+        </p:txBody>
+      </p:sp>
+      <p:sp>
+        <p:nvSpPr>
+          <p:cNvPr id="29" name="Прямоугольник 28"/>
           <p:cNvSpPr/>
           <p:nvPr/>
         </p:nvSpPr>
         <p:spPr>
           <a:xfrm>
-            <a:off x="2000232" y="4714884"/>
-            <a:ext cx="1357322" cy="571504"/>
+            <a:off x="2913147" y="4132028"/>
+            <a:ext cx="1373101" cy="571504"/>
           </a:xfrm>
           <a:prstGeom prst="rect">
             <a:avLst/>
@@ -3413,50 +3410,6 @@
             <a:pPr algn="ctr"/>
             <a:r>
               <a:rPr lang="en-US" dirty="0" smtClean="0"/>
-              <a:t>Encoding</a:t>
-            </a:r>
-            <a:endParaRPr lang="ru-RU" dirty="0"/>
-          </a:p>
-        </p:txBody>
-      </p:sp>
-      <p:sp>
-        <p:nvSpPr>
-          <p:cNvPr id="29" name="Прямоугольник 28"/>
-          <p:cNvSpPr/>
-          <p:nvPr/>
-        </p:nvSpPr>
-        <p:spPr>
-          <a:xfrm>
-            <a:off x="3857620" y="4714884"/>
-            <a:ext cx="1357322" cy="571504"/>
-          </a:xfrm>
-          <a:prstGeom prst="rect">
-            <a:avLst/>
-          </a:prstGeom>
-        </p:spPr>
-        <p:style>
-          <a:lnRef idx="2">
-            <a:schemeClr val="accent1">
-              <a:shade val="50000"/>
-            </a:schemeClr>
-          </a:lnRef>
-          <a:fillRef idx="1">
-            <a:schemeClr val="accent1"/>
-          </a:fillRef>
-          <a:effectRef idx="0">
-            <a:schemeClr val="accent1"/>
-          </a:effectRef>
-          <a:fontRef idx="minor">
-            <a:schemeClr val="lt1"/>
-          </a:fontRef>
-        </p:style>
-        <p:txBody>
-          <a:bodyPr rtlCol="0" anchor="ctr"/>
-          <a:lstStyle/>
-          <a:p>
-            <a:pPr algn="ctr"/>
-            <a:r>
-              <a:rPr lang="en-US" dirty="0" smtClean="0"/>
               <a:t>Connection</a:t>
             </a:r>
             <a:endParaRPr lang="ru-RU" dirty="0"/>
@@ -3473,57 +3426,14 @@
           <p:nvPr/>
         </p:nvCxnSpPr>
         <p:spPr>
-          <a:xfrm flipH="1">
-            <a:off x="2678893" y="4036223"/>
-            <a:ext cx="2607487" cy="678661"/>
+          <a:xfrm flipH="1" flipV="1">
+            <a:off x="3591808" y="3262715"/>
+            <a:ext cx="1694572" cy="493456"/>
           </a:xfrm>
           <a:prstGeom prst="bentConnector4">
             <a:avLst>
-              <a:gd name="adj1" fmla="val 19832"/>
-              <a:gd name="adj2" fmla="val -127757"/>
-            </a:avLst>
-          </a:prstGeom>
-          <a:ln>
-            <a:solidFill>
-              <a:srgbClr val="FF0000"/>
-            </a:solidFill>
-            <a:headEnd type="arrow"/>
-            <a:tailEnd type="arrow"/>
-          </a:ln>
-        </p:spPr>
-        <p:style>
-          <a:lnRef idx="1">
-            <a:schemeClr val="accent1"/>
-          </a:lnRef>
-          <a:fillRef idx="0">
-            <a:schemeClr val="accent1"/>
-          </a:fillRef>
-          <a:effectRef idx="0">
-            <a:schemeClr val="accent1"/>
-          </a:effectRef>
-          <a:fontRef idx="minor">
-            <a:schemeClr val="tx1"/>
-          </a:fontRef>
-        </p:style>
-      </p:cxnSp>
-      <p:cxnSp>
-        <p:nvCxnSpPr>
-          <p:cNvPr id="33" name="Соединительная линия уступом 32"/>
-          <p:cNvCxnSpPr>
-            <a:stCxn id="4" idx="3"/>
-            <a:endCxn id="15" idx="0"/>
-          </p:cNvCxnSpPr>
-          <p:nvPr/>
-        </p:nvCxnSpPr>
-        <p:spPr>
-          <a:xfrm flipH="1" flipV="1">
-            <a:off x="3607587" y="3786190"/>
-            <a:ext cx="1678793" cy="250033"/>
-          </a:xfrm>
-          <a:prstGeom prst="bentConnector4">
-            <a:avLst>
-              <a:gd name="adj1" fmla="val 41909"/>
-              <a:gd name="adj2" fmla="val 236702"/>
+              <a:gd name="adj1" fmla="val 31369"/>
+              <a:gd name="adj2" fmla="val 140153"/>
             </a:avLst>
           </a:prstGeom>
           <a:ln>
@@ -3560,56 +3470,13 @@
         </p:nvCxnSpPr>
         <p:spPr>
           <a:xfrm flipH="1">
-            <a:off x="4536281" y="4036223"/>
-            <a:ext cx="750099" cy="678661"/>
+            <a:off x="3599698" y="3756171"/>
+            <a:ext cx="1686682" cy="375857"/>
           </a:xfrm>
           <a:prstGeom prst="bentConnector4">
             <a:avLst>
-              <a:gd name="adj1" fmla="val 68941"/>
-              <a:gd name="adj2" fmla="val 59303"/>
-            </a:avLst>
-          </a:prstGeom>
-          <a:ln>
-            <a:solidFill>
-              <a:srgbClr val="FF0000"/>
-            </a:solidFill>
-            <a:headEnd type="arrow"/>
-            <a:tailEnd type="arrow"/>
-          </a:ln>
-        </p:spPr>
-        <p:style>
-          <a:lnRef idx="1">
-            <a:schemeClr val="accent1"/>
-          </a:lnRef>
-          <a:fillRef idx="0">
-            <a:schemeClr val="accent1"/>
-          </a:fillRef>
-          <a:effectRef idx="0">
-            <a:schemeClr val="accent1"/>
-          </a:effectRef>
-          <a:fontRef idx="minor">
-            <a:schemeClr val="tx1"/>
-          </a:fontRef>
-        </p:style>
-      </p:cxnSp>
-      <p:cxnSp>
-        <p:nvCxnSpPr>
-          <p:cNvPr id="47" name="Соединительная линия уступом 46"/>
-          <p:cNvCxnSpPr>
-            <a:stCxn id="16" idx="0"/>
-            <a:endCxn id="4" idx="3"/>
-          </p:cNvCxnSpPr>
-          <p:nvPr/>
-        </p:nvCxnSpPr>
-        <p:spPr>
-          <a:xfrm rot="16200000" flipH="1" flipV="1">
-            <a:off x="5697148" y="3303983"/>
-            <a:ext cx="321471" cy="1143008"/>
-          </a:xfrm>
-          <a:prstGeom prst="bentConnector4">
-            <a:avLst>
-              <a:gd name="adj1" fmla="val -71111"/>
-              <a:gd name="adj2" fmla="val 87500"/>
+              <a:gd name="adj1" fmla="val 31516"/>
+              <a:gd name="adj2" fmla="val 53418"/>
             </a:avLst>
           </a:prstGeom>
           <a:ln>
@@ -3679,6 +3546,49 @@
           </a:p>
         </p:txBody>
       </p:sp>
+      <p:cxnSp>
+        <p:nvCxnSpPr>
+          <p:cNvPr id="18" name="Прямая со стрелкой 17"/>
+          <p:cNvCxnSpPr>
+            <a:stCxn id="16" idx="0"/>
+            <a:endCxn id="4" idx="3"/>
+          </p:cNvCxnSpPr>
+          <p:nvPr/>
+        </p:nvCxnSpPr>
+        <p:spPr>
+          <a:xfrm rot="16200000" flipH="1" flipV="1">
+            <a:off x="5837174" y="3163957"/>
+            <a:ext cx="41419" cy="1143008"/>
+          </a:xfrm>
+          <a:prstGeom prst="bentConnector4">
+            <a:avLst>
+              <a:gd name="adj1" fmla="val -551921"/>
+              <a:gd name="adj2" fmla="val 87500"/>
+            </a:avLst>
+          </a:prstGeom>
+          <a:ln>
+            <a:solidFill>
+              <a:srgbClr val="FF0000"/>
+            </a:solidFill>
+            <a:headEnd type="triangle"/>
+            <a:tailEnd type="triangle"/>
+          </a:ln>
+        </p:spPr>
+        <p:style>
+          <a:lnRef idx="1">
+            <a:schemeClr val="accent1"/>
+          </a:lnRef>
+          <a:fillRef idx="0">
+            <a:schemeClr val="accent1"/>
+          </a:fillRef>
+          <a:effectRef idx="0">
+            <a:schemeClr val="accent1"/>
+          </a:effectRef>
+          <a:fontRef idx="minor">
+            <a:schemeClr val="tx1"/>
+          </a:fontRef>
+        </p:style>
+      </p:cxnSp>
     </p:spTree>
   </p:cSld>
   <p:clrMapOvr>
@@ -3924,11 +3834,7 @@
             </a:pPr>
             <a:r>
               <a:rPr lang="en-US" dirty="0" err="1" smtClean="0"/>
-              <a:t>GetWorkC</a:t>
-            </a:r>
-            <a:r>
-              <a:rPr lang="en-US" dirty="0" err="1" smtClean="0"/>
-              <a:t>lass</a:t>
+              <a:t>GetWorkClass</a:t>
             </a:r>
             <a:r>
               <a:rPr lang="en-US" dirty="0" smtClean="0"/>
@@ -3967,6 +3873,76 @@
             <a:r>
               <a:rPr lang="en-US" dirty="0" err="1" smtClean="0"/>
               <a:t>WorkClass</a:t>
+            </a:r>
+            <a:r>
+              <a:rPr lang="en-US" dirty="0" smtClean="0"/>
+              <a:t>}</a:t>
+            </a:r>
+            <a:endParaRPr lang="ru-RU" dirty="0"/>
+          </a:p>
+        </p:txBody>
+      </p:sp>
+      <p:sp>
+        <p:nvSpPr>
+          <p:cNvPr id="3" name="Прямоугольник 2"/>
+          <p:cNvSpPr/>
+          <p:nvPr/>
+        </p:nvSpPr>
+        <p:spPr>
+          <a:xfrm>
+            <a:off x="428596" y="3962948"/>
+            <a:ext cx="8258204" cy="762196"/>
+          </a:xfrm>
+          <a:prstGeom prst="rect">
+            <a:avLst/>
+          </a:prstGeom>
+        </p:spPr>
+        <p:style>
+          <a:lnRef idx="2">
+            <a:schemeClr val="accent1">
+              <a:shade val="50000"/>
+            </a:schemeClr>
+          </a:lnRef>
+          <a:fillRef idx="1">
+            <a:schemeClr val="accent1"/>
+          </a:fillRef>
+          <a:effectRef idx="0">
+            <a:schemeClr val="accent1"/>
+          </a:effectRef>
+          <a:fontRef idx="minor">
+            <a:schemeClr val="lt1"/>
+          </a:fontRef>
+        </p:style>
+        <p:txBody>
+          <a:bodyPr rtlCol="0" anchor="ctr"/>
+          <a:lstStyle/>
+          <a:p>
+            <a:pPr marL="285750" indent="-285750">
+              <a:buFont typeface="Arial" panose="020B0604020202020204" pitchFamily="34" charset="0"/>
+              <a:buChar char="•"/>
+            </a:pPr>
+            <a:r>
+              <a:rPr lang="en-US" dirty="0" err="1" smtClean="0"/>
+              <a:t>GetInitData</a:t>
+            </a:r>
+            <a:endParaRPr lang="en-US" dirty="0" smtClean="0"/>
+          </a:p>
+          <a:p>
+            <a:pPr marL="285750" indent="-285750" algn="r">
+              <a:buFont typeface="Arial" panose="020B0604020202020204" pitchFamily="34" charset="0"/>
+              <a:buChar char="•"/>
+            </a:pPr>
+            <a:r>
+              <a:rPr lang="en-US" dirty="0" err="1" smtClean="0"/>
+              <a:t>ReceiveInitData</a:t>
+            </a:r>
+            <a:r>
+              <a:rPr lang="en-US" dirty="0" smtClean="0"/>
+              <a:t>{</a:t>
+            </a:r>
+            <a:r>
+              <a:rPr lang="en-US" dirty="0" err="1" smtClean="0"/>
+              <a:t>ProxyIPs</a:t>
             </a:r>
             <a:r>
               <a:rPr lang="en-US" dirty="0" smtClean="0"/>

</xml_diff>